<commit_message>
default device added, help button added
</commit_message>
<xml_diff>
--- a/mudmaker/MUD-Visualizer/img/help/Presentation1.pptx
+++ b/mudmaker/MUD-Visualizer/img/help/Presentation1.pptx
@@ -6,10 +6,11 @@
   </p:sldMasterIdLst>
   <p:sldIdLst>
     <p:sldId id="256" r:id="rId2"/>
-    <p:sldId id="258" r:id="rId3"/>
-    <p:sldId id="259" r:id="rId4"/>
-    <p:sldId id="260" r:id="rId5"/>
-    <p:sldId id="261" r:id="rId6"/>
+    <p:sldId id="263" r:id="rId3"/>
+    <p:sldId id="258" r:id="rId4"/>
+    <p:sldId id="259" r:id="rId5"/>
+    <p:sldId id="260" r:id="rId6"/>
+    <p:sldId id="261" r:id="rId7"/>
   </p:sldIdLst>
   <p:sldSz cx="12192000" cy="6858000"/>
   <p:notesSz cx="6858000" cy="9144000"/>
@@ -108,6 +109,11 @@
       </a:defRPr>
     </a:lvl9pPr>
   </p:defaultTextStyle>
+  <p:extLst>
+    <p:ext uri="{EFAFB233-063F-42B5-8137-9DF3F51BA10A}">
+      <p15:sldGuideLst xmlns:p15="http://schemas.microsoft.com/office/powerpoint/2012/main"/>
+    </p:ext>
+  </p:extLst>
 </p:presentation>
 </file>
 
@@ -3100,6 +3106,753 @@
 </file>
 
 <file path=ppt/diagrams/colors5.xml><?xml version="1.0" encoding="utf-8"?>
+<dgm:colorsDef xmlns:dgm="http://schemas.openxmlformats.org/drawingml/2006/diagram" xmlns:a="http://schemas.openxmlformats.org/drawingml/2006/main" uniqueId="urn:microsoft.com/office/officeart/2005/8/colors/accent1_2">
+  <dgm:title val=""/>
+  <dgm:desc val=""/>
+  <dgm:catLst>
+    <dgm:cat type="accent1" pri="11200"/>
+  </dgm:catLst>
+  <dgm:styleLbl name="node0">
+    <dgm:fillClrLst meth="repeat">
+      <a:schemeClr val="accent1"/>
+    </dgm:fillClrLst>
+    <dgm:linClrLst meth="repeat">
+      <a:schemeClr val="lt1"/>
+    </dgm:linClrLst>
+    <dgm:effectClrLst/>
+    <dgm:txLinClrLst/>
+    <dgm:txFillClrLst/>
+    <dgm:txEffectClrLst/>
+  </dgm:styleLbl>
+  <dgm:styleLbl name="alignNode1">
+    <dgm:fillClrLst meth="repeat">
+      <a:schemeClr val="accent1"/>
+    </dgm:fillClrLst>
+    <dgm:linClrLst meth="repeat">
+      <a:schemeClr val="accent1"/>
+    </dgm:linClrLst>
+    <dgm:effectClrLst/>
+    <dgm:txLinClrLst/>
+    <dgm:txFillClrLst/>
+    <dgm:txEffectClrLst/>
+  </dgm:styleLbl>
+  <dgm:styleLbl name="node1">
+    <dgm:fillClrLst meth="repeat">
+      <a:schemeClr val="accent1"/>
+    </dgm:fillClrLst>
+    <dgm:linClrLst meth="repeat">
+      <a:schemeClr val="lt1"/>
+    </dgm:linClrLst>
+    <dgm:effectClrLst/>
+    <dgm:txLinClrLst/>
+    <dgm:txFillClrLst/>
+    <dgm:txEffectClrLst/>
+  </dgm:styleLbl>
+  <dgm:styleLbl name="lnNode1">
+    <dgm:fillClrLst meth="repeat">
+      <a:schemeClr val="accent1"/>
+    </dgm:fillClrLst>
+    <dgm:linClrLst meth="repeat">
+      <a:schemeClr val="lt1"/>
+    </dgm:linClrLst>
+    <dgm:effectClrLst/>
+    <dgm:txLinClrLst/>
+    <dgm:txFillClrLst/>
+    <dgm:txEffectClrLst/>
+  </dgm:styleLbl>
+  <dgm:styleLbl name="vennNode1">
+    <dgm:fillClrLst meth="repeat">
+      <a:schemeClr val="accent1">
+        <a:alpha val="50000"/>
+      </a:schemeClr>
+    </dgm:fillClrLst>
+    <dgm:linClrLst meth="repeat">
+      <a:schemeClr val="lt1"/>
+    </dgm:linClrLst>
+    <dgm:effectClrLst/>
+    <dgm:txLinClrLst/>
+    <dgm:txFillClrLst/>
+    <dgm:txEffectClrLst/>
+  </dgm:styleLbl>
+  <dgm:styleLbl name="node2">
+    <dgm:fillClrLst meth="repeat">
+      <a:schemeClr val="accent1"/>
+    </dgm:fillClrLst>
+    <dgm:linClrLst meth="repeat">
+      <a:schemeClr val="lt1"/>
+    </dgm:linClrLst>
+    <dgm:effectClrLst/>
+    <dgm:txLinClrLst/>
+    <dgm:txFillClrLst/>
+    <dgm:txEffectClrLst/>
+  </dgm:styleLbl>
+  <dgm:styleLbl name="node3">
+    <dgm:fillClrLst meth="repeat">
+      <a:schemeClr val="accent1"/>
+    </dgm:fillClrLst>
+    <dgm:linClrLst meth="repeat">
+      <a:schemeClr val="lt1"/>
+    </dgm:linClrLst>
+    <dgm:effectClrLst/>
+    <dgm:txLinClrLst/>
+    <dgm:txFillClrLst/>
+    <dgm:txEffectClrLst/>
+  </dgm:styleLbl>
+  <dgm:styleLbl name="node4">
+    <dgm:fillClrLst meth="repeat">
+      <a:schemeClr val="accent1"/>
+    </dgm:fillClrLst>
+    <dgm:linClrLst meth="repeat">
+      <a:schemeClr val="lt1"/>
+    </dgm:linClrLst>
+    <dgm:effectClrLst/>
+    <dgm:txLinClrLst/>
+    <dgm:txFillClrLst/>
+    <dgm:txEffectClrLst/>
+  </dgm:styleLbl>
+  <dgm:styleLbl name="fgImgPlace1">
+    <dgm:fillClrLst meth="repeat">
+      <a:schemeClr val="accent1">
+        <a:tint val="50000"/>
+      </a:schemeClr>
+    </dgm:fillClrLst>
+    <dgm:linClrLst meth="repeat">
+      <a:schemeClr val="lt1"/>
+    </dgm:linClrLst>
+    <dgm:effectClrLst/>
+    <dgm:txLinClrLst/>
+    <dgm:txFillClrLst meth="repeat">
+      <a:schemeClr val="lt1"/>
+    </dgm:txFillClrLst>
+    <dgm:txEffectClrLst/>
+  </dgm:styleLbl>
+  <dgm:styleLbl name="alignImgPlace1">
+    <dgm:fillClrLst meth="repeat">
+      <a:schemeClr val="accent1">
+        <a:tint val="50000"/>
+      </a:schemeClr>
+    </dgm:fillClrLst>
+    <dgm:linClrLst meth="repeat">
+      <a:schemeClr val="lt1"/>
+    </dgm:linClrLst>
+    <dgm:effectClrLst/>
+    <dgm:txLinClrLst/>
+    <dgm:txFillClrLst meth="repeat">
+      <a:schemeClr val="lt1"/>
+    </dgm:txFillClrLst>
+    <dgm:txEffectClrLst/>
+  </dgm:styleLbl>
+  <dgm:styleLbl name="bgImgPlace1">
+    <dgm:fillClrLst meth="repeat">
+      <a:schemeClr val="accent1">
+        <a:tint val="50000"/>
+      </a:schemeClr>
+    </dgm:fillClrLst>
+    <dgm:linClrLst meth="repeat">
+      <a:schemeClr val="lt1"/>
+    </dgm:linClrLst>
+    <dgm:effectClrLst/>
+    <dgm:txLinClrLst/>
+    <dgm:txFillClrLst meth="repeat">
+      <a:schemeClr val="lt1"/>
+    </dgm:txFillClrLst>
+    <dgm:txEffectClrLst/>
+  </dgm:styleLbl>
+  <dgm:styleLbl name="sibTrans2D1">
+    <dgm:fillClrLst meth="repeat">
+      <a:schemeClr val="accent1">
+        <a:tint val="60000"/>
+      </a:schemeClr>
+    </dgm:fillClrLst>
+    <dgm:linClrLst meth="repeat">
+      <a:schemeClr val="accent1">
+        <a:tint val="60000"/>
+      </a:schemeClr>
+    </dgm:linClrLst>
+    <dgm:effectClrLst/>
+    <dgm:txLinClrLst/>
+    <dgm:txFillClrLst/>
+    <dgm:txEffectClrLst/>
+  </dgm:styleLbl>
+  <dgm:styleLbl name="fgSibTrans2D1">
+    <dgm:fillClrLst meth="repeat">
+      <a:schemeClr val="accent1">
+        <a:tint val="60000"/>
+      </a:schemeClr>
+    </dgm:fillClrLst>
+    <dgm:linClrLst meth="repeat">
+      <a:schemeClr val="accent1">
+        <a:tint val="60000"/>
+      </a:schemeClr>
+    </dgm:linClrLst>
+    <dgm:effectClrLst/>
+    <dgm:txLinClrLst/>
+    <dgm:txFillClrLst/>
+    <dgm:txEffectClrLst/>
+  </dgm:styleLbl>
+  <dgm:styleLbl name="bgSibTrans2D1">
+    <dgm:fillClrLst meth="repeat">
+      <a:schemeClr val="accent1">
+        <a:tint val="60000"/>
+      </a:schemeClr>
+    </dgm:fillClrLst>
+    <dgm:linClrLst meth="repeat">
+      <a:schemeClr val="accent1">
+        <a:tint val="60000"/>
+      </a:schemeClr>
+    </dgm:linClrLst>
+    <dgm:effectClrLst/>
+    <dgm:txLinClrLst/>
+    <dgm:txFillClrLst/>
+    <dgm:txEffectClrLst/>
+  </dgm:styleLbl>
+  <dgm:styleLbl name="sibTrans1D1">
+    <dgm:fillClrLst meth="repeat">
+      <a:schemeClr val="accent1"/>
+    </dgm:fillClrLst>
+    <dgm:linClrLst meth="repeat">
+      <a:schemeClr val="accent1"/>
+    </dgm:linClrLst>
+    <dgm:effectClrLst/>
+    <dgm:txLinClrLst/>
+    <dgm:txFillClrLst meth="repeat">
+      <a:schemeClr val="tx1"/>
+    </dgm:txFillClrLst>
+    <dgm:txEffectClrLst/>
+  </dgm:styleLbl>
+  <dgm:styleLbl name="callout">
+    <dgm:fillClrLst meth="repeat">
+      <a:schemeClr val="accent1"/>
+    </dgm:fillClrLst>
+    <dgm:linClrLst meth="repeat">
+      <a:schemeClr val="accent1">
+        <a:tint val="50000"/>
+      </a:schemeClr>
+    </dgm:linClrLst>
+    <dgm:effectClrLst/>
+    <dgm:txLinClrLst/>
+    <dgm:txFillClrLst meth="repeat">
+      <a:schemeClr val="tx1"/>
+    </dgm:txFillClrLst>
+    <dgm:txEffectClrLst/>
+  </dgm:styleLbl>
+  <dgm:styleLbl name="asst0">
+    <dgm:fillClrLst meth="repeat">
+      <a:schemeClr val="accent1"/>
+    </dgm:fillClrLst>
+    <dgm:linClrLst meth="repeat">
+      <a:schemeClr val="lt1"/>
+    </dgm:linClrLst>
+    <dgm:effectClrLst/>
+    <dgm:txLinClrLst/>
+    <dgm:txFillClrLst/>
+    <dgm:txEffectClrLst/>
+  </dgm:styleLbl>
+  <dgm:styleLbl name="asst1">
+    <dgm:fillClrLst meth="repeat">
+      <a:schemeClr val="accent1"/>
+    </dgm:fillClrLst>
+    <dgm:linClrLst meth="repeat">
+      <a:schemeClr val="lt1"/>
+    </dgm:linClrLst>
+    <dgm:effectClrLst/>
+    <dgm:txLinClrLst/>
+    <dgm:txFillClrLst/>
+    <dgm:txEffectClrLst/>
+  </dgm:styleLbl>
+  <dgm:styleLbl name="asst2">
+    <dgm:fillClrLst meth="repeat">
+      <a:schemeClr val="accent1"/>
+    </dgm:fillClrLst>
+    <dgm:linClrLst meth="repeat">
+      <a:schemeClr val="lt1"/>
+    </dgm:linClrLst>
+    <dgm:effectClrLst/>
+    <dgm:txLinClrLst/>
+    <dgm:txFillClrLst/>
+    <dgm:txEffectClrLst/>
+  </dgm:styleLbl>
+  <dgm:styleLbl name="asst3">
+    <dgm:fillClrLst meth="repeat">
+      <a:schemeClr val="accent1"/>
+    </dgm:fillClrLst>
+    <dgm:linClrLst meth="repeat">
+      <a:schemeClr val="lt1"/>
+    </dgm:linClrLst>
+    <dgm:effectClrLst/>
+    <dgm:txLinClrLst/>
+    <dgm:txFillClrLst/>
+    <dgm:txEffectClrLst/>
+  </dgm:styleLbl>
+  <dgm:styleLbl name="asst4">
+    <dgm:fillClrLst meth="repeat">
+      <a:schemeClr val="accent1"/>
+    </dgm:fillClrLst>
+    <dgm:linClrLst meth="repeat">
+      <a:schemeClr val="lt1"/>
+    </dgm:linClrLst>
+    <dgm:effectClrLst/>
+    <dgm:txLinClrLst/>
+    <dgm:txFillClrLst/>
+    <dgm:txEffectClrLst/>
+  </dgm:styleLbl>
+  <dgm:styleLbl name="parChTrans2D1">
+    <dgm:fillClrLst meth="repeat">
+      <a:schemeClr val="accent1">
+        <a:tint val="60000"/>
+      </a:schemeClr>
+    </dgm:fillClrLst>
+    <dgm:linClrLst meth="repeat">
+      <a:schemeClr val="accent1">
+        <a:tint val="60000"/>
+      </a:schemeClr>
+    </dgm:linClrLst>
+    <dgm:effectClrLst/>
+    <dgm:txLinClrLst/>
+    <dgm:txFillClrLst meth="repeat">
+      <a:schemeClr val="lt1"/>
+    </dgm:txFillClrLst>
+    <dgm:txEffectClrLst/>
+  </dgm:styleLbl>
+  <dgm:styleLbl name="parChTrans2D2">
+    <dgm:fillClrLst meth="repeat">
+      <a:schemeClr val="accent1"/>
+    </dgm:fillClrLst>
+    <dgm:linClrLst meth="repeat">
+      <a:schemeClr val="accent1"/>
+    </dgm:linClrLst>
+    <dgm:effectClrLst/>
+    <dgm:txLinClrLst/>
+    <dgm:txFillClrLst meth="repeat">
+      <a:schemeClr val="lt1"/>
+    </dgm:txFillClrLst>
+    <dgm:txEffectClrLst/>
+  </dgm:styleLbl>
+  <dgm:styleLbl name="parChTrans2D3">
+    <dgm:fillClrLst meth="repeat">
+      <a:schemeClr val="accent1"/>
+    </dgm:fillClrLst>
+    <dgm:linClrLst meth="repeat">
+      <a:schemeClr val="accent1"/>
+    </dgm:linClrLst>
+    <dgm:effectClrLst/>
+    <dgm:txLinClrLst/>
+    <dgm:txFillClrLst meth="repeat">
+      <a:schemeClr val="lt1"/>
+    </dgm:txFillClrLst>
+    <dgm:txEffectClrLst/>
+  </dgm:styleLbl>
+  <dgm:styleLbl name="parChTrans2D4">
+    <dgm:fillClrLst meth="repeat">
+      <a:schemeClr val="accent1"/>
+    </dgm:fillClrLst>
+    <dgm:linClrLst meth="repeat">
+      <a:schemeClr val="accent1"/>
+    </dgm:linClrLst>
+    <dgm:effectClrLst/>
+    <dgm:txLinClrLst/>
+    <dgm:txFillClrLst meth="repeat">
+      <a:schemeClr val="lt1"/>
+    </dgm:txFillClrLst>
+    <dgm:txEffectClrLst/>
+  </dgm:styleLbl>
+  <dgm:styleLbl name="parChTrans1D1">
+    <dgm:fillClrLst meth="repeat">
+      <a:schemeClr val="accent1"/>
+    </dgm:fillClrLst>
+    <dgm:linClrLst meth="repeat">
+      <a:schemeClr val="accent1">
+        <a:shade val="60000"/>
+      </a:schemeClr>
+    </dgm:linClrLst>
+    <dgm:effectClrLst/>
+    <dgm:txLinClrLst/>
+    <dgm:txFillClrLst meth="repeat">
+      <a:schemeClr val="tx1"/>
+    </dgm:txFillClrLst>
+    <dgm:txEffectClrLst/>
+  </dgm:styleLbl>
+  <dgm:styleLbl name="parChTrans1D2">
+    <dgm:fillClrLst meth="repeat">
+      <a:schemeClr val="accent1"/>
+    </dgm:fillClrLst>
+    <dgm:linClrLst meth="repeat">
+      <a:schemeClr val="accent1">
+        <a:shade val="60000"/>
+      </a:schemeClr>
+    </dgm:linClrLst>
+    <dgm:effectClrLst/>
+    <dgm:txLinClrLst/>
+    <dgm:txFillClrLst meth="repeat">
+      <a:schemeClr val="tx1"/>
+    </dgm:txFillClrLst>
+    <dgm:txEffectClrLst/>
+  </dgm:styleLbl>
+  <dgm:styleLbl name="parChTrans1D3">
+    <dgm:fillClrLst meth="repeat">
+      <a:schemeClr val="accent1"/>
+    </dgm:fillClrLst>
+    <dgm:linClrLst meth="repeat">
+      <a:schemeClr val="accent1">
+        <a:shade val="80000"/>
+      </a:schemeClr>
+    </dgm:linClrLst>
+    <dgm:effectClrLst/>
+    <dgm:txLinClrLst/>
+    <dgm:txFillClrLst meth="repeat">
+      <a:schemeClr val="tx1"/>
+    </dgm:txFillClrLst>
+    <dgm:txEffectClrLst/>
+  </dgm:styleLbl>
+  <dgm:styleLbl name="parChTrans1D4">
+    <dgm:fillClrLst meth="repeat">
+      <a:schemeClr val="accent1"/>
+    </dgm:fillClrLst>
+    <dgm:linClrLst meth="repeat">
+      <a:schemeClr val="accent1">
+        <a:shade val="80000"/>
+      </a:schemeClr>
+    </dgm:linClrLst>
+    <dgm:effectClrLst/>
+    <dgm:txLinClrLst/>
+    <dgm:txFillClrLst meth="repeat">
+      <a:schemeClr val="tx1"/>
+    </dgm:txFillClrLst>
+    <dgm:txEffectClrLst/>
+  </dgm:styleLbl>
+  <dgm:styleLbl name="fgAcc1">
+    <dgm:fillClrLst meth="repeat">
+      <a:schemeClr val="lt1">
+        <a:alpha val="90000"/>
+      </a:schemeClr>
+    </dgm:fillClrLst>
+    <dgm:linClrLst meth="repeat">
+      <a:schemeClr val="accent1"/>
+    </dgm:linClrLst>
+    <dgm:effectClrLst/>
+    <dgm:txLinClrLst/>
+    <dgm:txFillClrLst meth="repeat">
+      <a:schemeClr val="dk1"/>
+    </dgm:txFillClrLst>
+    <dgm:txEffectClrLst/>
+  </dgm:styleLbl>
+  <dgm:styleLbl name="conFgAcc1">
+    <dgm:fillClrLst meth="repeat">
+      <a:schemeClr val="lt1">
+        <a:alpha val="90000"/>
+      </a:schemeClr>
+    </dgm:fillClrLst>
+    <dgm:linClrLst meth="repeat">
+      <a:schemeClr val="accent1"/>
+    </dgm:linClrLst>
+    <dgm:effectClrLst/>
+    <dgm:txLinClrLst/>
+    <dgm:txFillClrLst meth="repeat">
+      <a:schemeClr val="dk1"/>
+    </dgm:txFillClrLst>
+    <dgm:txEffectClrLst/>
+  </dgm:styleLbl>
+  <dgm:styleLbl name="alignAcc1">
+    <dgm:fillClrLst meth="repeat">
+      <a:schemeClr val="lt1">
+        <a:alpha val="90000"/>
+      </a:schemeClr>
+    </dgm:fillClrLst>
+    <dgm:linClrLst meth="repeat">
+      <a:schemeClr val="accent1"/>
+    </dgm:linClrLst>
+    <dgm:effectClrLst/>
+    <dgm:txLinClrLst/>
+    <dgm:txFillClrLst meth="repeat">
+      <a:schemeClr val="dk1"/>
+    </dgm:txFillClrLst>
+    <dgm:txEffectClrLst/>
+  </dgm:styleLbl>
+  <dgm:styleLbl name="trAlignAcc1">
+    <dgm:fillClrLst meth="repeat">
+      <a:schemeClr val="lt1">
+        <a:alpha val="40000"/>
+      </a:schemeClr>
+    </dgm:fillClrLst>
+    <dgm:linClrLst meth="repeat">
+      <a:schemeClr val="accent1"/>
+    </dgm:linClrLst>
+    <dgm:effectClrLst/>
+    <dgm:txLinClrLst/>
+    <dgm:txFillClrLst meth="repeat">
+      <a:schemeClr val="dk1"/>
+    </dgm:txFillClrLst>
+    <dgm:txEffectClrLst/>
+  </dgm:styleLbl>
+  <dgm:styleLbl name="bgAcc1">
+    <dgm:fillClrLst meth="repeat">
+      <a:schemeClr val="lt1">
+        <a:alpha val="90000"/>
+      </a:schemeClr>
+    </dgm:fillClrLst>
+    <dgm:linClrLst meth="repeat">
+      <a:schemeClr val="accent1"/>
+    </dgm:linClrLst>
+    <dgm:effectClrLst/>
+    <dgm:txLinClrLst/>
+    <dgm:txFillClrLst meth="repeat">
+      <a:schemeClr val="dk1"/>
+    </dgm:txFillClrLst>
+    <dgm:txEffectClrLst/>
+  </dgm:styleLbl>
+  <dgm:styleLbl name="solidFgAcc1">
+    <dgm:fillClrLst meth="repeat">
+      <a:schemeClr val="lt1"/>
+    </dgm:fillClrLst>
+    <dgm:linClrLst meth="repeat">
+      <a:schemeClr val="accent1"/>
+    </dgm:linClrLst>
+    <dgm:effectClrLst/>
+    <dgm:txLinClrLst/>
+    <dgm:txFillClrLst meth="repeat">
+      <a:schemeClr val="dk1"/>
+    </dgm:txFillClrLst>
+    <dgm:txEffectClrLst/>
+  </dgm:styleLbl>
+  <dgm:styleLbl name="solidAlignAcc1">
+    <dgm:fillClrLst meth="repeat">
+      <a:schemeClr val="lt1"/>
+    </dgm:fillClrLst>
+    <dgm:linClrLst meth="repeat">
+      <a:schemeClr val="accent1"/>
+    </dgm:linClrLst>
+    <dgm:effectClrLst/>
+    <dgm:txLinClrLst/>
+    <dgm:txFillClrLst meth="repeat">
+      <a:schemeClr val="dk1"/>
+    </dgm:txFillClrLst>
+    <dgm:txEffectClrLst/>
+  </dgm:styleLbl>
+  <dgm:styleLbl name="solidBgAcc1">
+    <dgm:fillClrLst meth="repeat">
+      <a:schemeClr val="lt1"/>
+    </dgm:fillClrLst>
+    <dgm:linClrLst meth="repeat">
+      <a:schemeClr val="accent1"/>
+    </dgm:linClrLst>
+    <dgm:effectClrLst/>
+    <dgm:txLinClrLst/>
+    <dgm:txFillClrLst meth="repeat">
+      <a:schemeClr val="dk1"/>
+    </dgm:txFillClrLst>
+    <dgm:txEffectClrLst/>
+  </dgm:styleLbl>
+  <dgm:styleLbl name="fgAccFollowNode1">
+    <dgm:fillClrLst meth="repeat">
+      <a:schemeClr val="accent1">
+        <a:alpha val="90000"/>
+        <a:tint val="40000"/>
+      </a:schemeClr>
+    </dgm:fillClrLst>
+    <dgm:linClrLst meth="repeat">
+      <a:schemeClr val="accent1">
+        <a:alpha val="90000"/>
+        <a:tint val="40000"/>
+      </a:schemeClr>
+    </dgm:linClrLst>
+    <dgm:effectClrLst/>
+    <dgm:txLinClrLst/>
+    <dgm:txFillClrLst meth="repeat">
+      <a:schemeClr val="dk1"/>
+    </dgm:txFillClrLst>
+    <dgm:txEffectClrLst/>
+  </dgm:styleLbl>
+  <dgm:styleLbl name="alignAccFollowNode1">
+    <dgm:fillClrLst meth="repeat">
+      <a:schemeClr val="accent1">
+        <a:alpha val="90000"/>
+        <a:tint val="40000"/>
+      </a:schemeClr>
+    </dgm:fillClrLst>
+    <dgm:linClrLst meth="repeat">
+      <a:schemeClr val="accent1">
+        <a:alpha val="90000"/>
+        <a:tint val="40000"/>
+      </a:schemeClr>
+    </dgm:linClrLst>
+    <dgm:effectClrLst/>
+    <dgm:txLinClrLst/>
+    <dgm:txFillClrLst meth="repeat">
+      <a:schemeClr val="dk1"/>
+    </dgm:txFillClrLst>
+    <dgm:txEffectClrLst/>
+  </dgm:styleLbl>
+  <dgm:styleLbl name="bgAccFollowNode1">
+    <dgm:fillClrLst meth="repeat">
+      <a:schemeClr val="accent1">
+        <a:alpha val="90000"/>
+        <a:tint val="40000"/>
+      </a:schemeClr>
+    </dgm:fillClrLst>
+    <dgm:linClrLst meth="repeat">
+      <a:schemeClr val="accent1">
+        <a:alpha val="90000"/>
+        <a:tint val="40000"/>
+      </a:schemeClr>
+    </dgm:linClrLst>
+    <dgm:effectClrLst/>
+    <dgm:txLinClrLst/>
+    <dgm:txFillClrLst meth="repeat">
+      <a:schemeClr val="dk1"/>
+    </dgm:txFillClrLst>
+    <dgm:txEffectClrLst/>
+  </dgm:styleLbl>
+  <dgm:styleLbl name="fgAcc0">
+    <dgm:fillClrLst meth="repeat">
+      <a:schemeClr val="lt1">
+        <a:alpha val="90000"/>
+      </a:schemeClr>
+    </dgm:fillClrLst>
+    <dgm:linClrLst meth="repeat">
+      <a:schemeClr val="accent1"/>
+    </dgm:linClrLst>
+    <dgm:effectClrLst/>
+    <dgm:txLinClrLst/>
+    <dgm:txFillClrLst meth="repeat">
+      <a:schemeClr val="dk1"/>
+    </dgm:txFillClrLst>
+    <dgm:txEffectClrLst/>
+  </dgm:styleLbl>
+  <dgm:styleLbl name="fgAcc2">
+    <dgm:fillClrLst meth="repeat">
+      <a:schemeClr val="lt1">
+        <a:alpha val="90000"/>
+      </a:schemeClr>
+    </dgm:fillClrLst>
+    <dgm:linClrLst meth="repeat">
+      <a:schemeClr val="accent1"/>
+    </dgm:linClrLst>
+    <dgm:effectClrLst/>
+    <dgm:txLinClrLst/>
+    <dgm:txFillClrLst meth="repeat">
+      <a:schemeClr val="dk1"/>
+    </dgm:txFillClrLst>
+    <dgm:txEffectClrLst/>
+  </dgm:styleLbl>
+  <dgm:styleLbl name="fgAcc3">
+    <dgm:fillClrLst meth="repeat">
+      <a:schemeClr val="lt1">
+        <a:alpha val="90000"/>
+      </a:schemeClr>
+    </dgm:fillClrLst>
+    <dgm:linClrLst meth="repeat">
+      <a:schemeClr val="accent1"/>
+    </dgm:linClrLst>
+    <dgm:effectClrLst/>
+    <dgm:txLinClrLst/>
+    <dgm:txFillClrLst meth="repeat">
+      <a:schemeClr val="dk1"/>
+    </dgm:txFillClrLst>
+    <dgm:txEffectClrLst/>
+  </dgm:styleLbl>
+  <dgm:styleLbl name="fgAcc4">
+    <dgm:fillClrLst meth="repeat">
+      <a:schemeClr val="lt1">
+        <a:alpha val="90000"/>
+      </a:schemeClr>
+    </dgm:fillClrLst>
+    <dgm:linClrLst meth="repeat">
+      <a:schemeClr val="accent1"/>
+    </dgm:linClrLst>
+    <dgm:effectClrLst/>
+    <dgm:txLinClrLst/>
+    <dgm:txFillClrLst meth="repeat">
+      <a:schemeClr val="dk1"/>
+    </dgm:txFillClrLst>
+    <dgm:txEffectClrLst/>
+  </dgm:styleLbl>
+  <dgm:styleLbl name="bgShp">
+    <dgm:fillClrLst meth="repeat">
+      <a:schemeClr val="accent1">
+        <a:tint val="40000"/>
+      </a:schemeClr>
+    </dgm:fillClrLst>
+    <dgm:linClrLst meth="repeat">
+      <a:schemeClr val="accent1"/>
+    </dgm:linClrLst>
+    <dgm:effectClrLst/>
+    <dgm:txLinClrLst/>
+    <dgm:txFillClrLst meth="repeat">
+      <a:schemeClr val="dk1"/>
+    </dgm:txFillClrLst>
+    <dgm:txEffectClrLst/>
+  </dgm:styleLbl>
+  <dgm:styleLbl name="dkBgShp">
+    <dgm:fillClrLst meth="repeat">
+      <a:schemeClr val="accent1">
+        <a:shade val="80000"/>
+      </a:schemeClr>
+    </dgm:fillClrLst>
+    <dgm:linClrLst meth="repeat">
+      <a:schemeClr val="accent1"/>
+    </dgm:linClrLst>
+    <dgm:effectClrLst/>
+    <dgm:txLinClrLst/>
+    <dgm:txFillClrLst meth="repeat">
+      <a:schemeClr val="lt1"/>
+    </dgm:txFillClrLst>
+    <dgm:txEffectClrLst/>
+  </dgm:styleLbl>
+  <dgm:styleLbl name="trBgShp">
+    <dgm:fillClrLst meth="repeat">
+      <a:schemeClr val="accent1">
+        <a:tint val="50000"/>
+        <a:alpha val="40000"/>
+      </a:schemeClr>
+    </dgm:fillClrLst>
+    <dgm:linClrLst meth="repeat">
+      <a:schemeClr val="accent1"/>
+    </dgm:linClrLst>
+    <dgm:effectClrLst/>
+    <dgm:txLinClrLst/>
+    <dgm:txFillClrLst meth="repeat">
+      <a:schemeClr val="lt1"/>
+    </dgm:txFillClrLst>
+    <dgm:txEffectClrLst/>
+  </dgm:styleLbl>
+  <dgm:styleLbl name="fgShp">
+    <dgm:fillClrLst meth="repeat">
+      <a:schemeClr val="accent1">
+        <a:tint val="60000"/>
+      </a:schemeClr>
+    </dgm:fillClrLst>
+    <dgm:linClrLst meth="repeat">
+      <a:schemeClr val="lt1"/>
+    </dgm:linClrLst>
+    <dgm:effectClrLst/>
+    <dgm:txLinClrLst/>
+    <dgm:txFillClrLst meth="repeat">
+      <a:schemeClr val="dk1"/>
+    </dgm:txFillClrLst>
+    <dgm:txEffectClrLst/>
+  </dgm:styleLbl>
+  <dgm:styleLbl name="revTx">
+    <dgm:fillClrLst meth="repeat">
+      <a:schemeClr val="lt1">
+        <a:alpha val="0"/>
+      </a:schemeClr>
+    </dgm:fillClrLst>
+    <dgm:linClrLst meth="repeat">
+      <a:schemeClr val="dk1">
+        <a:alpha val="0"/>
+      </a:schemeClr>
+    </dgm:linClrLst>
+    <dgm:effectClrLst/>
+    <dgm:txLinClrLst/>
+    <dgm:txFillClrLst meth="repeat">
+      <a:schemeClr val="tx1"/>
+    </dgm:txFillClrLst>
+    <dgm:txEffectClrLst/>
+  </dgm:styleLbl>
+</dgm:colorsDef>
+</file>
+
+<file path=ppt/diagrams/colors6.xml><?xml version="1.0" encoding="utf-8"?>
 <dgm:colorsDef xmlns:dgm="http://schemas.openxmlformats.org/drawingml/2006/diagram" xmlns:a="http://schemas.openxmlformats.org/drawingml/2006/main" uniqueId="urn:microsoft.com/office/officeart/2005/8/colors/accent1_2">
   <dgm:title val=""/>
   <dgm:desc val=""/>
@@ -3906,14 +4659,9 @@
       <dgm:spPr/>
     </dgm:pt>
     <dgm:pt modelId="{2C10B32D-BCA1-4AEC-85CF-BD6910B7250B}" type="pres">
-      <dgm:prSet presAssocID="{00D311D5-0FC9-41D9-9C06-D40B69D0ABFE}" presName="arrowNode" presStyleLbl="node1" presStyleIdx="0" presStyleCnt="1" custAng="477580" custScaleX="69481" custScaleY="91084" custLinFactNeighborX="-45177" custLinFactNeighborY="4878"/>
+      <dgm:prSet presAssocID="{00D311D5-0FC9-41D9-9C06-D40B69D0ABFE}" presName="arrowNode" presStyleLbl="node1" presStyleIdx="0" presStyleCnt="1" custAng="477580" custScaleX="69481" custScaleY="91084" custLinFactNeighborX="-55725" custLinFactNeighborY="6745"/>
       <dgm:spPr>
-        <a:solidFill>
-          <a:schemeClr val="tx1">
-            <a:lumMod val="65000"/>
-            <a:lumOff val="35000"/>
-          </a:schemeClr>
-        </a:solidFill>
+        <a:noFill/>
       </dgm:spPr>
     </dgm:pt>
     <dgm:pt modelId="{50476A14-6600-4AC6-9A57-53AD1E49308F}" type="pres">
@@ -4002,7 +4750,7 @@
       <dgm:spPr/>
     </dgm:pt>
     <dgm:pt modelId="{2C10B32D-BCA1-4AEC-85CF-BD6910B7250B}" type="pres">
-      <dgm:prSet presAssocID="{00D311D5-0FC9-41D9-9C06-D40B69D0ABFE}" presName="arrowNode" presStyleLbl="node1" presStyleIdx="0" presStyleCnt="1" custAng="21122420" custFlipHor="1" custScaleX="35635" custScaleY="100000" custLinFactNeighborX="-87084" custLinFactNeighborY="29031"/>
+      <dgm:prSet presAssocID="{00D311D5-0FC9-41D9-9C06-D40B69D0ABFE}" presName="arrowNode" presStyleLbl="node1" presStyleIdx="0" presStyleCnt="1" custAng="477580" custScaleX="69481" custScaleY="91084" custLinFactNeighborX="-55725" custLinFactNeighborY="6745"/>
       <dgm:spPr>
         <a:noFill/>
       </dgm:spPr>
@@ -4306,6 +5054,97 @@
 </dgm:dataModel>
 </file>
 
+<file path=ppt/diagrams/data6.xml><?xml version="1.0" encoding="utf-8"?>
+<dgm:dataModel xmlns:dgm="http://schemas.openxmlformats.org/drawingml/2006/diagram" xmlns:a="http://schemas.openxmlformats.org/drawingml/2006/main">
+  <dgm:ptLst>
+    <dgm:pt modelId="{00D311D5-0FC9-41D9-9C06-D40B69D0ABFE}" type="doc">
+      <dgm:prSet loTypeId="urn:microsoft.com/office/officeart/2009/3/layout/DescendingProcess" loCatId="process" qsTypeId="urn:microsoft.com/office/officeart/2005/8/quickstyle/simple5" qsCatId="simple" csTypeId="urn:microsoft.com/office/officeart/2005/8/colors/accent1_2" csCatId="accent1" phldr="1"/>
+      <dgm:spPr/>
+      <dgm:t>
+        <a:bodyPr/>
+        <a:lstStyle/>
+        <a:p>
+          <a:endParaRPr lang="en-US"/>
+        </a:p>
+      </dgm:t>
+    </dgm:pt>
+    <dgm:pt modelId="{EA5F04E8-ABB8-4C1C-AD93-B7CC596CB392}">
+      <dgm:prSet phldrT="[Text]"/>
+      <dgm:spPr/>
+      <dgm:t>
+        <a:bodyPr/>
+        <a:lstStyle/>
+        <a:p>
+          <a:r>
+            <a:rPr lang="en-US" dirty="0"/>
+            <a:t> </a:t>
+          </a:r>
+        </a:p>
+      </dgm:t>
+    </dgm:pt>
+    <dgm:pt modelId="{2DEF295D-CA79-4AF5-ABF0-6AE31A6F2636}" type="sibTrans" cxnId="{ADF89714-3B12-4144-87A5-ABF1C3B55521}">
+      <dgm:prSet/>
+      <dgm:spPr/>
+      <dgm:t>
+        <a:bodyPr/>
+        <a:lstStyle/>
+        <a:p>
+          <a:endParaRPr lang="en-US"/>
+        </a:p>
+      </dgm:t>
+    </dgm:pt>
+    <dgm:pt modelId="{45AD3EA8-18FA-41E1-A483-0DFC83EFEEEF}" type="parTrans" cxnId="{ADF89714-3B12-4144-87A5-ABF1C3B55521}">
+      <dgm:prSet/>
+      <dgm:spPr/>
+      <dgm:t>
+        <a:bodyPr/>
+        <a:lstStyle/>
+        <a:p>
+          <a:endParaRPr lang="en-US"/>
+        </a:p>
+      </dgm:t>
+    </dgm:pt>
+    <dgm:pt modelId="{701204F9-7563-493E-AD41-9B4204AC2A06}" type="pres">
+      <dgm:prSet presAssocID="{00D311D5-0FC9-41D9-9C06-D40B69D0ABFE}" presName="Name0" presStyleCnt="0">
+        <dgm:presLayoutVars>
+          <dgm:chMax val="7"/>
+          <dgm:chPref val="5"/>
+        </dgm:presLayoutVars>
+      </dgm:prSet>
+      <dgm:spPr/>
+    </dgm:pt>
+    <dgm:pt modelId="{2C10B32D-BCA1-4AEC-85CF-BD6910B7250B}" type="pres">
+      <dgm:prSet presAssocID="{00D311D5-0FC9-41D9-9C06-D40B69D0ABFE}" presName="arrowNode" presStyleLbl="node1" presStyleIdx="0" presStyleCnt="1" custAng="21122420" custFlipHor="1" custScaleX="35635" custScaleY="100000" custLinFactNeighborX="-87084" custLinFactNeighborY="29031"/>
+      <dgm:spPr>
+        <a:noFill/>
+      </dgm:spPr>
+    </dgm:pt>
+    <dgm:pt modelId="{50476A14-6600-4AC6-9A57-53AD1E49308F}" type="pres">
+      <dgm:prSet presAssocID="{EA5F04E8-ABB8-4C1C-AD93-B7CC596CB392}" presName="txNode1" presStyleLbl="revTx" presStyleIdx="0" presStyleCnt="1">
+        <dgm:presLayoutVars>
+          <dgm:bulletEnabled val="1"/>
+        </dgm:presLayoutVars>
+      </dgm:prSet>
+      <dgm:spPr/>
+    </dgm:pt>
+  </dgm:ptLst>
+  <dgm:cxnLst>
+    <dgm:cxn modelId="{ADF89714-3B12-4144-87A5-ABF1C3B55521}" srcId="{00D311D5-0FC9-41D9-9C06-D40B69D0ABFE}" destId="{EA5F04E8-ABB8-4C1C-AD93-B7CC596CB392}" srcOrd="0" destOrd="0" parTransId="{45AD3EA8-18FA-41E1-A483-0DFC83EFEEEF}" sibTransId="{2DEF295D-CA79-4AF5-ABF0-6AE31A6F2636}"/>
+    <dgm:cxn modelId="{8AA22847-43CD-49B4-9FEB-394602C772C1}" type="presOf" srcId="{00D311D5-0FC9-41D9-9C06-D40B69D0ABFE}" destId="{701204F9-7563-493E-AD41-9B4204AC2A06}" srcOrd="0" destOrd="0" presId="urn:microsoft.com/office/officeart/2009/3/layout/DescendingProcess"/>
+    <dgm:cxn modelId="{C9BF8669-B698-4344-BC79-FDEC7CC3A76D}" type="presOf" srcId="{EA5F04E8-ABB8-4C1C-AD93-B7CC596CB392}" destId="{50476A14-6600-4AC6-9A57-53AD1E49308F}" srcOrd="0" destOrd="0" presId="urn:microsoft.com/office/officeart/2009/3/layout/DescendingProcess"/>
+    <dgm:cxn modelId="{8EE416D8-39B0-4010-8EB6-CDEE638292D7}" type="presParOf" srcId="{701204F9-7563-493E-AD41-9B4204AC2A06}" destId="{2C10B32D-BCA1-4AEC-85CF-BD6910B7250B}" srcOrd="0" destOrd="0" presId="urn:microsoft.com/office/officeart/2009/3/layout/DescendingProcess"/>
+    <dgm:cxn modelId="{1F8E0EA6-8519-4F9F-B68B-E2CE2706A9CD}" type="presParOf" srcId="{701204F9-7563-493E-AD41-9B4204AC2A06}" destId="{50476A14-6600-4AC6-9A57-53AD1E49308F}" srcOrd="1" destOrd="0" presId="urn:microsoft.com/office/officeart/2009/3/layout/DescendingProcess"/>
+  </dgm:cxnLst>
+  <dgm:bg/>
+  <dgm:whole/>
+  <dgm:extLst>
+    <a:ext uri="http://schemas.microsoft.com/office/drawing/2008/diagram">
+      <dsp:dataModelExt xmlns:dsp="http://schemas.microsoft.com/office/drawing/2008/diagram" relId="rId7" minVer="http://schemas.openxmlformats.org/drawingml/2006/diagram"/>
+    </a:ext>
+  </dgm:extLst>
+</dgm:dataModel>
+</file>
+
 <file path=ppt/diagrams/drawing1.xml><?xml version="1.0" encoding="utf-8"?>
 <dsp:drawing xmlns:dgm="http://schemas.openxmlformats.org/drawingml/2006/diagram" xmlns:dsp="http://schemas.microsoft.com/office/drawing/2008/diagram" xmlns:a="http://schemas.openxmlformats.org/drawingml/2006/main">
   <dsp:spTree>
@@ -4321,7 +5160,7 @@
       </dsp:nvSpPr>
       <dsp:spPr>
         <a:xfrm rot="4873954">
-          <a:off x="-438115" y="2879337"/>
+          <a:off x="-613034" y="2517131"/>
           <a:ext cx="2558867" cy="1037596"/>
         </a:xfrm>
         <a:prstGeom prst="swooshArrow">
@@ -4330,12 +5169,7 @@
             <a:gd name="adj2" fmla="val 31370"/>
           </a:avLst>
         </a:prstGeom>
-        <a:solidFill>
-          <a:schemeClr val="tx1">
-            <a:lumMod val="65000"/>
-            <a:lumOff val="35000"/>
-          </a:schemeClr>
-        </a:solidFill>
+        <a:noFill/>
         <a:ln>
           <a:noFill/>
         </a:ln>
@@ -4369,7 +5203,7 @@
       </dsp:nvSpPr>
       <dsp:spPr>
         <a:xfrm>
-          <a:off x="488806" y="1741729"/>
+          <a:off x="488806" y="1323170"/>
           <a:ext cx="1228465" cy="482934"/>
         </a:xfrm>
         <a:prstGeom prst="rect">
@@ -4418,7 +5252,7 @@
         </a:p>
       </dsp:txBody>
       <dsp:txXfrm>
-        <a:off x="488806" y="1741729"/>
+        <a:off x="488806" y="1323170"/>
         <a:ext cx="1228465" cy="482934"/>
       </dsp:txXfrm>
     </dsp:sp>
@@ -4440,9 +5274,9 @@
         <dsp:cNvSpPr/>
       </dsp:nvSpPr>
       <dsp:spPr>
-        <a:xfrm rot="17681206" flipH="1">
-          <a:off x="-127812" y="2855249"/>
-          <a:ext cx="3251928" cy="977302"/>
+        <a:xfrm rot="4873954">
+          <a:off x="-613034" y="2517131"/>
+          <a:ext cx="2558867" cy="1037596"/>
         </a:xfrm>
         <a:prstGeom prst="swooshArrow">
           <a:avLst>
@@ -4484,8 +5318,8 @@
       </dsp:nvSpPr>
       <dsp:spPr>
         <a:xfrm>
-          <a:off x="2955887" y="0"/>
-          <a:ext cx="2591468" cy="1018759"/>
+          <a:off x="488806" y="1323170"/>
+          <a:ext cx="1228465" cy="482934"/>
         </a:xfrm>
         <a:prstGeom prst="rect">
           <a:avLst/>
@@ -4509,12 +5343,12 @@
         <a:fontRef idx="minor"/>
       </dsp:style>
       <dsp:txBody>
-        <a:bodyPr spcFirstLastPara="0" vert="horz" wrap="square" lIns="77470" tIns="77470" rIns="77470" bIns="77470" numCol="1" spcCol="1270" anchor="b" anchorCtr="0">
+        <a:bodyPr spcFirstLastPara="0" vert="horz" wrap="square" lIns="36830" tIns="36830" rIns="36830" bIns="36830" numCol="1" spcCol="1270" anchor="b" anchorCtr="0">
           <a:noAutofit/>
         </a:bodyPr>
         <a:lstStyle/>
         <a:p>
-          <a:pPr marL="0" lvl="0" indent="0" algn="ctr" defTabSz="2711450">
+          <a:pPr marL="0" lvl="0" indent="0" algn="ctr" defTabSz="1289050">
             <a:lnSpc>
               <a:spcPct val="90000"/>
             </a:lnSpc>
@@ -4527,14 +5361,14 @@
             <a:buNone/>
           </a:pPr>
           <a:r>
-            <a:rPr lang="en-US" sz="6100" kern="1200" dirty="0"/>
+            <a:rPr lang="en-US" sz="2900" kern="1200" dirty="0"/>
             <a:t> </a:t>
           </a:r>
         </a:p>
       </dsp:txBody>
       <dsp:txXfrm>
-        <a:off x="2955887" y="0"/>
-        <a:ext cx="2591468" cy="1018759"/>
+        <a:off x="488806" y="1323170"/>
+        <a:ext cx="1228465" cy="482934"/>
       </dsp:txXfrm>
     </dsp:sp>
   </dsp:spTree>
@@ -4772,6 +5606,121 @@
 </file>
 
 <file path=ppt/diagrams/drawing5.xml><?xml version="1.0" encoding="utf-8"?>
+<dsp:drawing xmlns:dgm="http://schemas.openxmlformats.org/drawingml/2006/diagram" xmlns:dsp="http://schemas.microsoft.com/office/drawing/2008/diagram" xmlns:a="http://schemas.openxmlformats.org/drawingml/2006/main">
+  <dsp:spTree>
+    <dsp:nvGrpSpPr>
+      <dsp:cNvPr id="0" name=""/>
+      <dsp:cNvGrpSpPr/>
+    </dsp:nvGrpSpPr>
+    <dsp:grpSpPr/>
+    <dsp:sp modelId="{2C10B32D-BCA1-4AEC-85CF-BD6910B7250B}">
+      <dsp:nvSpPr>
+        <dsp:cNvPr id="0" name=""/>
+        <dsp:cNvSpPr/>
+      </dsp:nvSpPr>
+      <dsp:spPr>
+        <a:xfrm rot="17681206" flipH="1">
+          <a:off x="-127812" y="2855249"/>
+          <a:ext cx="3251928" cy="977302"/>
+        </a:xfrm>
+        <a:prstGeom prst="swooshArrow">
+          <a:avLst>
+            <a:gd name="adj1" fmla="val 16310"/>
+            <a:gd name="adj2" fmla="val 31370"/>
+          </a:avLst>
+        </a:prstGeom>
+        <a:noFill/>
+        <a:ln>
+          <a:noFill/>
+        </a:ln>
+        <a:effectLst>
+          <a:outerShdw blurRad="57150" dist="19050" dir="5400000" algn="ctr" rotWithShape="0">
+            <a:srgbClr val="000000">
+              <a:alpha val="63000"/>
+            </a:srgbClr>
+          </a:outerShdw>
+        </a:effectLst>
+      </dsp:spPr>
+      <dsp:style>
+        <a:lnRef idx="0">
+          <a:scrgbClr r="0" g="0" b="0"/>
+        </a:lnRef>
+        <a:fillRef idx="3">
+          <a:scrgbClr r="0" g="0" b="0"/>
+        </a:fillRef>
+        <a:effectRef idx="3">
+          <a:scrgbClr r="0" g="0" b="0"/>
+        </a:effectRef>
+        <a:fontRef idx="minor">
+          <a:schemeClr val="lt1"/>
+        </a:fontRef>
+      </dsp:style>
+    </dsp:sp>
+    <dsp:sp modelId="{50476A14-6600-4AC6-9A57-53AD1E49308F}">
+      <dsp:nvSpPr>
+        <dsp:cNvPr id="0" name=""/>
+        <dsp:cNvSpPr/>
+      </dsp:nvSpPr>
+      <dsp:spPr>
+        <a:xfrm>
+          <a:off x="2955887" y="0"/>
+          <a:ext cx="2591468" cy="1018759"/>
+        </a:xfrm>
+        <a:prstGeom prst="rect">
+          <a:avLst/>
+        </a:prstGeom>
+        <a:noFill/>
+        <a:ln>
+          <a:noFill/>
+        </a:ln>
+        <a:effectLst/>
+      </dsp:spPr>
+      <dsp:style>
+        <a:lnRef idx="0">
+          <a:scrgbClr r="0" g="0" b="0"/>
+        </a:lnRef>
+        <a:fillRef idx="0">
+          <a:scrgbClr r="0" g="0" b="0"/>
+        </a:fillRef>
+        <a:effectRef idx="0">
+          <a:scrgbClr r="0" g="0" b="0"/>
+        </a:effectRef>
+        <a:fontRef idx="minor"/>
+      </dsp:style>
+      <dsp:txBody>
+        <a:bodyPr spcFirstLastPara="0" vert="horz" wrap="square" lIns="77470" tIns="77470" rIns="77470" bIns="77470" numCol="1" spcCol="1270" anchor="b" anchorCtr="0">
+          <a:noAutofit/>
+        </a:bodyPr>
+        <a:lstStyle/>
+        <a:p>
+          <a:pPr marL="0" lvl="0" indent="0" algn="ctr" defTabSz="2711450">
+            <a:lnSpc>
+              <a:spcPct val="90000"/>
+            </a:lnSpc>
+            <a:spcBef>
+              <a:spcPct val="0"/>
+            </a:spcBef>
+            <a:spcAft>
+              <a:spcPct val="35000"/>
+            </a:spcAft>
+            <a:buNone/>
+          </a:pPr>
+          <a:r>
+            <a:rPr lang="en-US" sz="6100" kern="1200" dirty="0"/>
+            <a:t> </a:t>
+          </a:r>
+        </a:p>
+      </dsp:txBody>
+      <dsp:txXfrm>
+        <a:off x="2955887" y="0"/>
+        <a:ext cx="2591468" cy="1018759"/>
+      </dsp:txXfrm>
+    </dsp:sp>
+  </dsp:spTree>
+</dsp:drawing>
+</file>
+
+<file path=ppt/diagrams/drawing6.xml><?xml version="1.0" encoding="utf-8"?>
 <dsp:drawing xmlns:dgm="http://schemas.openxmlformats.org/drawingml/2006/diagram" xmlns:dsp="http://schemas.microsoft.com/office/drawing/2008/diagram" xmlns:a="http://schemas.openxmlformats.org/drawingml/2006/main">
   <dsp:spTree>
     <dsp:nvGrpSpPr>
@@ -8286,6 +9235,686 @@
 </dgm:layoutDef>
 </file>
 
+<file path=ppt/diagrams/layout6.xml><?xml version="1.0" encoding="utf-8"?>
+<dgm:layoutDef xmlns:dgm="http://schemas.openxmlformats.org/drawingml/2006/diagram" xmlns:a="http://schemas.openxmlformats.org/drawingml/2006/main" uniqueId="urn:microsoft.com/office/officeart/2009/3/layout/DescendingProcess">
+  <dgm:title val=""/>
+  <dgm:desc val=""/>
+  <dgm:catLst>
+    <dgm:cat type="process" pri="23500"/>
+  </dgm:catLst>
+  <dgm:sampData>
+    <dgm:dataModel>
+      <dgm:ptLst>
+        <dgm:pt modelId="0" type="doc"/>
+        <dgm:pt modelId="1">
+          <dgm:prSet phldr="1"/>
+        </dgm:pt>
+        <dgm:pt modelId="2">
+          <dgm:prSet phldr="1"/>
+        </dgm:pt>
+        <dgm:pt modelId="3">
+          <dgm:prSet phldr="1"/>
+        </dgm:pt>
+        <dgm:pt modelId="4">
+          <dgm:prSet phldr="1"/>
+        </dgm:pt>
+        <dgm:pt modelId="5">
+          <dgm:prSet phldr="1"/>
+        </dgm:pt>
+      </dgm:ptLst>
+      <dgm:cxnLst>
+        <dgm:cxn modelId="6" srcId="0" destId="1" srcOrd="0" destOrd="0"/>
+        <dgm:cxn modelId="7" srcId="0" destId="2" srcOrd="1" destOrd="0"/>
+        <dgm:cxn modelId="8" srcId="0" destId="3" srcOrd="2" destOrd="0"/>
+        <dgm:cxn modelId="9" srcId="0" destId="4" srcOrd="3" destOrd="0"/>
+        <dgm:cxn modelId="10" srcId="0" destId="5" srcOrd="4" destOrd="0"/>
+      </dgm:cxnLst>
+      <dgm:bg/>
+      <dgm:whole/>
+    </dgm:dataModel>
+  </dgm:sampData>
+  <dgm:styleData>
+    <dgm:dataModel>
+      <dgm:ptLst>
+        <dgm:pt modelId="0" type="doc"/>
+        <dgm:pt modelId="1">
+          <dgm:prSet phldr="1"/>
+        </dgm:pt>
+        <dgm:pt modelId="2">
+          <dgm:prSet phldr="1"/>
+        </dgm:pt>
+        <dgm:pt modelId="3">
+          <dgm:prSet phldr="1"/>
+        </dgm:pt>
+      </dgm:ptLst>
+      <dgm:cxnLst>
+        <dgm:cxn modelId="4" srcId="0" destId="1" srcOrd="0" destOrd="0"/>
+        <dgm:cxn modelId="5" srcId="0" destId="2" srcOrd="1" destOrd="0"/>
+        <dgm:cxn modelId="6" srcId="0" destId="3" srcOrd="2" destOrd="0"/>
+      </dgm:cxnLst>
+      <dgm:bg/>
+      <dgm:whole/>
+    </dgm:dataModel>
+  </dgm:styleData>
+  <dgm:clrData>
+    <dgm:dataModel>
+      <dgm:ptLst>
+        <dgm:pt modelId="0" type="doc"/>
+        <dgm:pt modelId="1">
+          <dgm:prSet phldr="1"/>
+        </dgm:pt>
+        <dgm:pt modelId="2">
+          <dgm:prSet phldr="1"/>
+        </dgm:pt>
+        <dgm:pt modelId="3">
+          <dgm:prSet phldr="1"/>
+        </dgm:pt>
+      </dgm:ptLst>
+      <dgm:cxnLst>
+        <dgm:cxn modelId="4" srcId="0" destId="1" srcOrd="0" destOrd="0"/>
+        <dgm:cxn modelId="5" srcId="0" destId="2" srcOrd="1" destOrd="0"/>
+        <dgm:cxn modelId="6" srcId="0" destId="3" srcOrd="2" destOrd="0"/>
+      </dgm:cxnLst>
+      <dgm:bg/>
+      <dgm:whole/>
+    </dgm:dataModel>
+  </dgm:clrData>
+  <dgm:layoutNode name="Name0">
+    <dgm:varLst>
+      <dgm:chMax val="7"/>
+      <dgm:chPref val="5"/>
+    </dgm:varLst>
+    <dgm:alg type="composite">
+      <dgm:param type="ar" val="1.1"/>
+    </dgm:alg>
+    <dgm:shape xmlns:r="http://schemas.openxmlformats.org/officeDocument/2006/relationships" r:blip="">
+      <dgm:adjLst/>
+    </dgm:shape>
+    <dgm:choose name="Name1">
+      <dgm:if name="Name2" axis="ch" ptType="node" func="cnt" op="equ" val="1">
+        <dgm:constrLst>
+          <dgm:constr type="primFontSz" for="ch" ptType="node" op="equ" val="65"/>
+          <dgm:constr type="w" for="ch" forName="arrowNode" refType="w" fact="0.75"/>
+          <dgm:constr type="h" for="ch" forName="arrowNode" refType="h"/>
+          <dgm:constr type="l" for="ch" forName="arrowNode" refType="w" fact="0.07"/>
+          <dgm:constr type="t" for="ch" forName="arrowNode"/>
+          <dgm:constr type="l" for="ch" forName="txNode1" refType="w" fact="0"/>
+          <dgm:constr type="t" for="ch" forName="txNode1" refType="h" fact="0"/>
+          <dgm:constr type="r" for="ch" forName="txNode1" refType="w" fact="0.37"/>
+          <dgm:constr type="h" for="ch" forName="txNode1" refType="h" fact="0.16"/>
+        </dgm:constrLst>
+      </dgm:if>
+      <dgm:if name="Name3" axis="ch" ptType="node" func="cnt" op="equ" val="2">
+        <dgm:constrLst>
+          <dgm:constr type="primFontSz" for="ch" ptType="node" op="equ" val="65"/>
+          <dgm:constr type="w" for="ch" forName="arrowNode" refType="w" fact="0.75"/>
+          <dgm:constr type="h" for="ch" forName="arrowNode" refType="h"/>
+          <dgm:constr type="l" for="ch" forName="arrowNode" refType="w" fact="0.07"/>
+          <dgm:constr type="t" for="ch" forName="arrowNode"/>
+          <dgm:constr type="l" for="ch" forName="txNode1" refType="w" fact="0"/>
+          <dgm:constr type="t" for="ch" forName="txNode1" refType="h" fact="0"/>
+          <dgm:constr type="r" for="ch" forName="txNode1" refType="w" fact="0.37"/>
+          <dgm:constr type="h" for="ch" forName="txNode1" refType="h" fact="0.16"/>
+          <dgm:constr type="l" for="ch" forName="txNode2" refType="w" fact="0.5"/>
+          <dgm:constr type="b" for="ch" forName="txNode2" refType="h"/>
+          <dgm:constr type="r" for="ch" forName="txNode2" refType="w"/>
+          <dgm:constr type="h" for="ch" forName="txNode2" refType="h" fact="0.16"/>
+        </dgm:constrLst>
+      </dgm:if>
+      <dgm:if name="Name4" axis="ch" ptType="node" func="cnt" op="equ" val="3">
+        <dgm:constrLst>
+          <dgm:constr type="primFontSz" for="ch" ptType="node" op="equ" val="65"/>
+          <dgm:constr type="w" for="ch" forName="arrowNode" refType="w" fact="0.75"/>
+          <dgm:constr type="h" for="ch" forName="arrowNode" refType="h"/>
+          <dgm:constr type="l" for="ch" forName="arrowNode" refType="w" fact="0.07"/>
+          <dgm:constr type="t" for="ch" forName="arrowNode"/>
+          <dgm:constr type="l" for="ch" forName="txNode1" refType="w" fact="0"/>
+          <dgm:constr type="t" for="ch" forName="txNode1" refType="h" fact="0"/>
+          <dgm:constr type="r" for="ch" forName="txNode1" refType="w" fact="0.37"/>
+          <dgm:constr type="h" for="ch" forName="txNode1" refType="h" fact="0.16"/>
+          <dgm:constr type="l" for="ch" forName="txNode2" refType="w" fact="0.56"/>
+          <dgm:constr type="ctrY" for="ch" forName="txNode2" refType="h" fact="0.3992"/>
+          <dgm:constr type="r" for="ch" forName="txNode2" refType="w"/>
+          <dgm:constr type="h" for="ch" forName="txNode2" refType="h" fact="0.16"/>
+          <dgm:constr type="l" for="ch" forName="txNode3" refType="w" fact="0.5"/>
+          <dgm:constr type="b" for="ch" forName="txNode3" refType="h"/>
+          <dgm:constr type="r" for="ch" forName="txNode3" refType="w"/>
+          <dgm:constr type="h" for="ch" forName="txNode3" refType="h" fact="0.16"/>
+          <dgm:constr type="ctrX" for="ch" forName="dotNode2" refType="w" fact="0.4782"/>
+          <dgm:constr type="ctrY" for="ch" forName="dotNode2" refType="h" fact="0.3992"/>
+          <dgm:constr type="h" for="ch" forName="dotNode2" refType="h" fact="0.0218"/>
+          <dgm:constr type="w" for="ch" forName="dotNode2" refType="h" refFor="ch" refForName="dotNode2"/>
+        </dgm:constrLst>
+      </dgm:if>
+      <dgm:if name="Name5" axis="ch" ptType="node" func="cnt" op="equ" val="4">
+        <dgm:constrLst>
+          <dgm:constr type="primFontSz" for="ch" ptType="node" op="equ" val="65"/>
+          <dgm:constr type="w" for="ch" forName="arrowNode" refType="w" fact="0.75"/>
+          <dgm:constr type="h" for="ch" forName="arrowNode" refType="h"/>
+          <dgm:constr type="l" for="ch" forName="arrowNode" refType="w" fact="0.07"/>
+          <dgm:constr type="t" for="ch" forName="arrowNode"/>
+          <dgm:constr type="l" for="ch" forName="txNode1" refType="w" fact="0"/>
+          <dgm:constr type="t" for="ch" forName="txNode1" refType="h" fact="0"/>
+          <dgm:constr type="r" for="ch" forName="txNode1" refType="w" fact="0.37"/>
+          <dgm:constr type="h" for="ch" forName="txNode1" refType="h" fact="0.16"/>
+          <dgm:constr type="l" for="ch" forName="txNode2" refType="w" fact="0.49"/>
+          <dgm:constr type="ctrY" for="ch" forName="txNode2" refType="h" fact="0.3153"/>
+          <dgm:constr type="r" for="ch" forName="txNode2" refType="w"/>
+          <dgm:constr type="h" for="ch" forName="txNode2" refType="h" fact="0.16"/>
+          <dgm:constr type="l" for="ch" forName="txNode3" refType="w" fact="0"/>
+          <dgm:constr type="ctrY" for="ch" forName="txNode3" refType="h" fact="0.5004"/>
+          <dgm:constr type="r" for="ch" forName="txNode3" refType="w" fact="0.5"/>
+          <dgm:constr type="h" for="ch" forName="txNode3" refType="h" fact="0.16"/>
+          <dgm:constr type="l" for="ch" forName="txNode4" refType="w" fact="0.5"/>
+          <dgm:constr type="b" for="ch" forName="txNode4" refType="h"/>
+          <dgm:constr type="r" for="ch" forName="txNode4" refType="w"/>
+          <dgm:constr type="h" for="ch" forName="txNode4" refType="h" fact="0.16"/>
+          <dgm:constr type="ctrX" for="ch" forName="dotNode2" refType="w" fact="0.39"/>
+          <dgm:constr type="ctrY" for="ch" forName="dotNode2" refType="h" fact="0.3153"/>
+          <dgm:constr type="h" for="ch" forName="dotNode2" refType="h" fact="0.0218"/>
+          <dgm:constr type="w" for="ch" forName="dotNode2" refType="h" refFor="ch" refForName="dotNode2"/>
+          <dgm:constr type="ctrX" for="ch" forName="dotNode3" refType="w" fact="0.5626"/>
+          <dgm:constr type="ctrY" for="ch" forName="dotNode3" refType="h" fact="0.5004"/>
+          <dgm:constr type="h" for="ch" forName="dotNode3" refType="h" fact="0.0218"/>
+          <dgm:constr type="w" for="ch" forName="dotNode3" refType="h" refFor="ch" refForName="dotNode3"/>
+        </dgm:constrLst>
+      </dgm:if>
+      <dgm:if name="Name6" axis="ch" ptType="node" func="cnt" op="equ" val="5">
+        <dgm:constrLst>
+          <dgm:constr type="primFontSz" for="ch" ptType="node" op="equ" val="65"/>
+          <dgm:constr type="w" for="ch" forName="arrowNode" refType="w" fact="0.75"/>
+          <dgm:constr type="h" for="ch" forName="arrowNode" refType="h"/>
+          <dgm:constr type="l" for="ch" forName="arrowNode" refType="w" fact="0.07"/>
+          <dgm:constr type="t" for="ch" forName="arrowNode"/>
+          <dgm:constr type="l" for="ch" forName="txNode1" refType="w" fact="0"/>
+          <dgm:constr type="t" for="ch" forName="txNode1" refType="h" fact="0"/>
+          <dgm:constr type="r" for="ch" forName="txNode1" refType="w" fact="0.37"/>
+          <dgm:constr type="h" for="ch" forName="txNode1" refType="h" fact="0.16"/>
+          <dgm:constr type="l" for="ch" forName="txNode2" refType="w" fact="0.46"/>
+          <dgm:constr type="ctrY" for="ch" forName="txNode2" refType="h" fact="0.2885"/>
+          <dgm:constr type="r" for="ch" forName="txNode2" refType="w"/>
+          <dgm:constr type="h" for="ch" forName="txNode2" refType="h" fact="0.16"/>
+          <dgm:constr type="l" for="ch" forName="txNode3" refType="w" fact="0"/>
+          <dgm:constr type="ctrY" for="ch" forName="txNode3" refType="h" fact="0.4089"/>
+          <dgm:constr type="r" for="ch" forName="txNode3" refType="w" fact="0.43"/>
+          <dgm:constr type="h" for="ch" forName="txNode3" refType="h" fact="0.16"/>
+          <dgm:constr type="l" for="ch" forName="txNode4" refType="w" fact="0.67"/>
+          <dgm:constr type="ctrY" for="ch" forName="txNode4" refType="h" fact="0.5497"/>
+          <dgm:constr type="r" for="ch" forName="txNode4" refType="w"/>
+          <dgm:constr type="h" for="ch" forName="txNode4" refType="h" fact="0.16"/>
+          <dgm:constr type="l" for="ch" forName="txNode5" refType="w" fact="0.5"/>
+          <dgm:constr type="b" for="ch" forName="txNode5" refType="h"/>
+          <dgm:constr type="r" for="ch" forName="txNode5" refType="w"/>
+          <dgm:constr type="h" for="ch" forName="txNode5" refType="h" fact="0.16"/>
+          <dgm:constr type="ctrX" for="ch" forName="dotNode2" refType="w" fact="0.3565"/>
+          <dgm:constr type="ctrY" for="ch" forName="dotNode2" refType="h" fact="0.2885"/>
+          <dgm:constr type="h" for="ch" forName="dotNode2" refType="h" fact="0.0218"/>
+          <dgm:constr type="w" for="ch" forName="dotNode2" refType="h" refFor="ch" refForName="dotNode2"/>
+          <dgm:constr type="ctrX" for="ch" forName="dotNode3" refType="w" fact="0.4922"/>
+          <dgm:constr type="ctrY" for="ch" forName="dotNode3" refType="h" fact="0.4089"/>
+          <dgm:constr type="h" for="ch" forName="dotNode3" refType="h" fact="0.0218"/>
+          <dgm:constr type="w" for="ch" forName="dotNode3" refType="h" refFor="ch" refForName="dotNode3"/>
+          <dgm:constr type="ctrX" for="ch" forName="dotNode4" refType="w" fact="0.5939"/>
+          <dgm:constr type="ctrY" for="ch" forName="dotNode4" refType="h" fact="0.5497"/>
+          <dgm:constr type="h" for="ch" forName="dotNode4" refType="h" fact="0.0218"/>
+          <dgm:constr type="w" for="ch" forName="dotNode4" refType="h" refFor="ch" refForName="dotNode4"/>
+        </dgm:constrLst>
+      </dgm:if>
+      <dgm:if name="Name7" axis="ch" ptType="node" func="cnt" op="equ" val="6">
+        <dgm:constrLst>
+          <dgm:constr type="primFontSz" for="ch" ptType="node" op="equ" val="65"/>
+          <dgm:constr type="w" for="ch" forName="arrowNode" refType="w" fact="0.75"/>
+          <dgm:constr type="h" for="ch" forName="arrowNode" refType="h"/>
+          <dgm:constr type="l" for="ch" forName="arrowNode" refType="w" fact="0.07"/>
+          <dgm:constr type="t" for="ch" forName="arrowNode"/>
+          <dgm:constr type="l" for="ch" forName="txNode1" refType="w" fact="0"/>
+          <dgm:constr type="t" for="ch" forName="txNode1" refType="h" fact="0"/>
+          <dgm:constr type="r" for="ch" forName="txNode1" refType="w" fact="0.37"/>
+          <dgm:constr type="h" for="ch" forName="txNode1" refType="h" fact="0.16"/>
+          <dgm:constr type="l" for="ch" forName="txNode2" refType="w" fact="0.45"/>
+          <dgm:constr type="ctrY" for="ch" forName="txNode2" refType="h" fact="0.2693"/>
+          <dgm:constr type="r" for="ch" forName="txNode2" refType="w"/>
+          <dgm:constr type="h" for="ch" forName="txNode2" refType="h" fact="0.16"/>
+          <dgm:constr type="l" for="ch" forName="txNode3" refType="w" fact="0"/>
+          <dgm:constr type="ctrY" for="ch" forName="txNode3" refType="h" fact="0.3638"/>
+          <dgm:constr type="r" for="ch" forName="txNode3" refType="w" fact="0.37"/>
+          <dgm:constr type="h" for="ch" forName="txNode3" refType="h" fact="0.16"/>
+          <dgm:constr type="l" for="ch" forName="txNode4" refType="w" fact="0.63"/>
+          <dgm:constr type="ctrY" for="ch" forName="txNode4" refType="h" fact="0.4744"/>
+          <dgm:constr type="r" for="ch" forName="txNode4" refType="w"/>
+          <dgm:constr type="h" for="ch" forName="txNode4" refType="h" fact="0.16"/>
+          <dgm:constr type="l" for="ch" forName="txNode5" refType="w" fact="0"/>
+          <dgm:constr type="ctrY" for="ch" forName="txNode5" refType="h" fact="0.5961"/>
+          <dgm:constr type="r" for="ch" forName="txNode5" refType="w" fact="0.55"/>
+          <dgm:constr type="h" for="ch" forName="txNode5" refType="h" fact="0.16"/>
+          <dgm:constr type="l" for="ch" forName="txNode6" refType="w" fact="0.5"/>
+          <dgm:constr type="b" for="ch" forName="txNode6" refType="h"/>
+          <dgm:constr type="r" for="ch" forName="txNode6" refType="w"/>
+          <dgm:constr type="h" for="ch" forName="txNode6" refType="h" fact="0.16"/>
+          <dgm:constr type="ctrX" for="ch" forName="dotNode2" refType="w" fact="0.33"/>
+          <dgm:constr type="ctrY" for="ch" forName="dotNode2" refType="h" fact="0.2693"/>
+          <dgm:constr type="h" for="ch" forName="dotNode2" refType="h" fact="0.0218"/>
+          <dgm:constr type="w" for="ch" forName="dotNode2" refType="h" refFor="ch" refForName="dotNode2"/>
+          <dgm:constr type="ctrX" for="ch" forName="dotNode3" refType="w" fact="0.4419"/>
+          <dgm:constr type="ctrY" for="ch" forName="dotNode3" refType="h" fact="0.3638"/>
+          <dgm:constr type="h" for="ch" forName="dotNode3" refType="h" fact="0.0218"/>
+          <dgm:constr type="w" for="ch" forName="dotNode3" refType="h" refFor="ch" refForName="dotNode3"/>
+          <dgm:constr type="ctrX" for="ch" forName="dotNode4" refType="w" fact="0.5425"/>
+          <dgm:constr type="ctrY" for="ch" forName="dotNode4" refType="h" fact="0.4744"/>
+          <dgm:constr type="h" for="ch" forName="dotNode4" refType="h" fact="0.0218"/>
+          <dgm:constr type="w" for="ch" forName="dotNode4" refType="h" refFor="ch" refForName="dotNode4"/>
+          <dgm:constr type="ctrX" for="ch" forName="dotNode5" refType="w" fact="0.6153"/>
+          <dgm:constr type="ctrY" for="ch" forName="dotNode5" refType="h" fact="0.5961"/>
+          <dgm:constr type="h" for="ch" forName="dotNode5" refType="h" fact="0.0218"/>
+          <dgm:constr type="w" for="ch" forName="dotNode5" refType="h" refFor="ch" refForName="dotNode5"/>
+        </dgm:constrLst>
+      </dgm:if>
+      <dgm:else name="Name8">
+        <dgm:constrLst>
+          <dgm:constr type="primFontSz" for="ch" ptType="node" op="equ" val="65"/>
+          <dgm:constr type="w" for="ch" forName="arrowNode" refType="w" fact="0.75"/>
+          <dgm:constr type="h" for="ch" forName="arrowNode" refType="h"/>
+          <dgm:constr type="l" for="ch" forName="arrowNode" refType="w" fact="0.07"/>
+          <dgm:constr type="t" for="ch" forName="arrowNode"/>
+          <dgm:constr type="l" for="ch" forName="txNode1" refType="w" fact="0"/>
+          <dgm:constr type="t" for="ch" forName="txNode1" refType="h" fact="0"/>
+          <dgm:constr type="r" for="ch" forName="txNode1" refType="w" fact="0.37"/>
+          <dgm:constr type="h" for="ch" forName="txNode1" refType="h" fact="0.16"/>
+          <dgm:constr type="l" for="ch" forName="txNode2" refType="w" fact="0.44"/>
+          <dgm:constr type="ctrY" for="ch" forName="txNode2" refType="h" fact="0.2693"/>
+          <dgm:constr type="r" for="ch" forName="txNode2" refType="w"/>
+          <dgm:constr type="h" for="ch" forName="txNode2" refType="h" fact="0.16"/>
+          <dgm:constr type="l" for="ch" forName="txNode3" refType="w" fact="0"/>
+          <dgm:constr type="ctrY" for="ch" forName="txNode3" refType="h" fact="0.3424"/>
+          <dgm:constr type="r" for="ch" forName="txNode3" refType="w" fact="0.33"/>
+          <dgm:constr type="h" for="ch" forName="txNode3" refType="h" fact="0.16"/>
+          <dgm:constr type="l" for="ch" forName="txNode4" refType="w" fact="0.61"/>
+          <dgm:constr type="ctrY" for="ch" forName="txNode4" refType="h" fact="0.4276"/>
+          <dgm:constr type="r" for="ch" forName="txNode4" refType="w"/>
+          <dgm:constr type="h" for="ch" forName="txNode4" refType="h" fact="0.16"/>
+          <dgm:constr type="l" for="ch" forName="txNode5" refType="w" fact="0"/>
+          <dgm:constr type="ctrY" for="ch" forName="txNode5" refType="h" fact="0.5218"/>
+          <dgm:constr type="r" for="ch" forName="txNode5" refType="w" fact="0.5"/>
+          <dgm:constr type="h" for="ch" forName="txNode5" refType="h" fact="0.16"/>
+          <dgm:constr type="l" for="ch" forName="txNode6" refType="w" fact="0.71"/>
+          <dgm:constr type="ctrY" for="ch" forName="txNode6" refType="h" fact="0.6179"/>
+          <dgm:constr type="r" for="ch" forName="txNode6" refType="w"/>
+          <dgm:constr type="h" for="ch" forName="txNode6" refType="h" fact="0.16"/>
+          <dgm:constr type="l" for="ch" forName="txNode7" refType="w" fact="0.5"/>
+          <dgm:constr type="b" for="ch" forName="txNode7" refType="h"/>
+          <dgm:constr type="r" for="ch" forName="txNode7" refType="w"/>
+          <dgm:constr type="h" for="ch" forName="txNode7" refType="h" fact="0.16"/>
+          <dgm:constr type="ctrX" for="ch" forName="dotNode2" refType="w" fact="0.33"/>
+          <dgm:constr type="ctrY" for="ch" forName="dotNode2" refType="h" fact="0.2693"/>
+          <dgm:constr type="h" for="ch" forName="dotNode2" refType="h" fact="0.0218"/>
+          <dgm:constr type="w" for="ch" forName="dotNode2" refType="h" refFor="ch" refForName="dotNode2"/>
+          <dgm:constr type="ctrX" for="ch" forName="dotNode3" refType="w" fact="0.425"/>
+          <dgm:constr type="ctrY" for="ch" forName="dotNode3" refType="h" fact="0.3424"/>
+          <dgm:constr type="h" for="ch" forName="dotNode3" refType="h" fact="0.0218"/>
+          <dgm:constr type="w" for="ch" forName="dotNode3" refType="h" refFor="ch" refForName="dotNode3"/>
+          <dgm:constr type="ctrX" for="ch" forName="dotNode4" refType="w" fact="0.505"/>
+          <dgm:constr type="ctrY" for="ch" forName="dotNode4" refType="h" fact="0.4276"/>
+          <dgm:constr type="h" for="ch" forName="dotNode4" refType="h" fact="0.0218"/>
+          <dgm:constr type="w" for="ch" forName="dotNode4" refType="h" refFor="ch" refForName="dotNode4"/>
+          <dgm:constr type="ctrX" for="ch" forName="dotNode5" refType="w" fact="0.5742"/>
+          <dgm:constr type="ctrY" for="ch" forName="dotNode5" refType="h" fact="0.5218"/>
+          <dgm:constr type="h" for="ch" forName="dotNode5" refType="h" fact="0.0218"/>
+          <dgm:constr type="w" for="ch" forName="dotNode5" refType="h" refFor="ch" refForName="dotNode5"/>
+          <dgm:constr type="ctrX" for="ch" forName="dotNode6" refType="w" fact="0.63"/>
+          <dgm:constr type="ctrY" for="ch" forName="dotNode6" refType="h" fact="0.6179"/>
+          <dgm:constr type="h" for="ch" forName="dotNode6" refType="h" fact="0.0218"/>
+          <dgm:constr type="w" for="ch" forName="dotNode6" refType="h" refFor="ch" refForName="dotNode6"/>
+        </dgm:constrLst>
+      </dgm:else>
+    </dgm:choose>
+    <dgm:forEach name="Name9" axis="self" ptType="parTrans">
+      <dgm:forEach name="Name10" axis="self" ptType="sibTrans" st="2">
+        <dgm:forEach name="dotRepeat" axis="self">
+          <dgm:layoutNode name="dotRepeatNode" styleLbl="fgShp">
+            <dgm:alg type="sp"/>
+            <dgm:shape xmlns:r="http://schemas.openxmlformats.org/officeDocument/2006/relationships" type="ellipse" r:blip="">
+              <dgm:adjLst/>
+            </dgm:shape>
+            <dgm:presOf axis="self"/>
+          </dgm:layoutNode>
+        </dgm:forEach>
+      </dgm:forEach>
+    </dgm:forEach>
+    <dgm:choose name="Name11">
+      <dgm:if name="Name12" axis="ch" ptType="node" func="cnt" op="gte" val="1">
+        <dgm:layoutNode name="arrowNode" styleLbl="node1">
+          <dgm:alg type="sp"/>
+          <dgm:shape xmlns:r="http://schemas.openxmlformats.org/officeDocument/2006/relationships" rot="73.2729" type="swooshArrow" r:blip="">
+            <dgm:adjLst>
+              <dgm:adj idx="1" val="0.1631"/>
+              <dgm:adj idx="2" val="0.3137"/>
+            </dgm:adjLst>
+          </dgm:shape>
+          <dgm:presOf/>
+        </dgm:layoutNode>
+      </dgm:if>
+      <dgm:else name="Name13"/>
+    </dgm:choose>
+    <dgm:forEach name="Name14" axis="ch" ptType="node" cnt="1">
+      <dgm:layoutNode name="txNode1" styleLbl="revTx">
+        <dgm:varLst>
+          <dgm:bulletEnabled val="1"/>
+        </dgm:varLst>
+        <dgm:alg type="tx">
+          <dgm:param type="txAnchorVert" val="b"/>
+        </dgm:alg>
+        <dgm:shape xmlns:r="http://schemas.openxmlformats.org/officeDocument/2006/relationships" type="rect" r:blip="" zOrderOff="10">
+          <dgm:adjLst/>
+        </dgm:shape>
+        <dgm:presOf axis="desOrSelf" ptType="node"/>
+        <dgm:constrLst>
+          <dgm:constr type="lMarg" refType="primFontSz" fact="0.1"/>
+          <dgm:constr type="rMarg" refType="primFontSz" fact="0.1"/>
+          <dgm:constr type="tMarg" refType="primFontSz" fact="0.1"/>
+          <dgm:constr type="bMarg" refType="primFontSz" fact="0.1"/>
+        </dgm:constrLst>
+        <dgm:ruleLst>
+          <dgm:rule type="primFontSz" val="5" fact="NaN" max="NaN"/>
+        </dgm:ruleLst>
+      </dgm:layoutNode>
+    </dgm:forEach>
+    <dgm:forEach name="Name15" axis="ch" ptType="node" st="2" cnt="1">
+      <dgm:layoutNode name="txNode2" styleLbl="revTx">
+        <dgm:varLst>
+          <dgm:bulletEnabled val="1"/>
+        </dgm:varLst>
+        <dgm:choose name="Name16">
+          <dgm:if name="Name17" axis="self" ptType="node" func="revPos" op="equ" val="1">
+            <dgm:alg type="tx">
+              <dgm:param type="txAnchorVert" val="t"/>
+            </dgm:alg>
+          </dgm:if>
+          <dgm:if name="Name18" axis="self" ptType="node" func="posOdd" op="equ" val="1">
+            <dgm:alg type="tx">
+              <dgm:param type="parTxLTRAlign" val="r"/>
+              <dgm:param type="parTxRTLAlign" val="r"/>
+            </dgm:alg>
+          </dgm:if>
+          <dgm:else name="Name19">
+            <dgm:alg type="tx">
+              <dgm:param type="parTxLTRAlign" val="l"/>
+              <dgm:param type="parTxRTLAlign" val="l"/>
+            </dgm:alg>
+          </dgm:else>
+        </dgm:choose>
+        <dgm:shape xmlns:r="http://schemas.openxmlformats.org/officeDocument/2006/relationships" type="rect" r:blip="" zOrderOff="10">
+          <dgm:adjLst/>
+        </dgm:shape>
+        <dgm:presOf axis="desOrSelf" ptType="node"/>
+        <dgm:constrLst>
+          <dgm:constr type="lMarg" refType="primFontSz" fact="0.1"/>
+          <dgm:constr type="rMarg" refType="primFontSz" fact="0.1"/>
+          <dgm:constr type="tMarg" refType="primFontSz" fact="0.1"/>
+          <dgm:constr type="bMarg" refType="primFontSz" fact="0.1"/>
+        </dgm:constrLst>
+        <dgm:ruleLst>
+          <dgm:rule type="primFontSz" val="5" fact="NaN" max="NaN"/>
+        </dgm:ruleLst>
+      </dgm:layoutNode>
+      <dgm:choose name="Name20">
+        <dgm:if name="Name21" axis="par ch" ptType="all node" func="cnt" op="neq" val="2">
+          <dgm:forEach name="Name22" axis="follow" ptType="sibTrans" cnt="1">
+            <dgm:layoutNode name="dotNode2">
+              <dgm:alg type="sp"/>
+              <dgm:shape xmlns:r="http://schemas.openxmlformats.org/officeDocument/2006/relationships" r:blip="">
+                <dgm:adjLst/>
+              </dgm:shape>
+              <dgm:presOf/>
+              <dgm:forEach name="Name23" ref="dotRepeat"/>
+            </dgm:layoutNode>
+          </dgm:forEach>
+        </dgm:if>
+        <dgm:else name="Name24"/>
+      </dgm:choose>
+    </dgm:forEach>
+    <dgm:forEach name="Name25" axis="ch" ptType="node" st="3" cnt="1">
+      <dgm:layoutNode name="txNode3" styleLbl="revTx">
+        <dgm:varLst>
+          <dgm:bulletEnabled val="1"/>
+        </dgm:varLst>
+        <dgm:choose name="Name26">
+          <dgm:if name="Name27" axis="self" ptType="node" func="revPos" op="equ" val="1">
+            <dgm:alg type="tx">
+              <dgm:param type="txAnchorVert" val="t"/>
+            </dgm:alg>
+          </dgm:if>
+          <dgm:if name="Name28" axis="self" ptType="node" func="posOdd" op="equ" val="1">
+            <dgm:alg type="tx">
+              <dgm:param type="parTxLTRAlign" val="r"/>
+              <dgm:param type="parTxRTLAlign" val="r"/>
+            </dgm:alg>
+          </dgm:if>
+          <dgm:else name="Name29">
+            <dgm:alg type="tx">
+              <dgm:param type="parTxLTRAlign" val="l"/>
+              <dgm:param type="parTxRTLAlign" val="l"/>
+            </dgm:alg>
+          </dgm:else>
+        </dgm:choose>
+        <dgm:shape xmlns:r="http://schemas.openxmlformats.org/officeDocument/2006/relationships" type="rect" r:blip="" zOrderOff="10">
+          <dgm:adjLst/>
+        </dgm:shape>
+        <dgm:presOf axis="desOrSelf" ptType="node"/>
+        <dgm:constrLst>
+          <dgm:constr type="lMarg" refType="primFontSz" fact="0.1"/>
+          <dgm:constr type="rMarg" refType="primFontSz" fact="0.1"/>
+          <dgm:constr type="tMarg" refType="primFontSz" fact="0.1"/>
+          <dgm:constr type="bMarg" refType="primFontSz" fact="0.1"/>
+        </dgm:constrLst>
+        <dgm:ruleLst>
+          <dgm:rule type="primFontSz" val="5" fact="NaN" max="NaN"/>
+        </dgm:ruleLst>
+      </dgm:layoutNode>
+      <dgm:choose name="Name30">
+        <dgm:if name="Name31" axis="par ch" ptType="all node" func="cnt" op="neq" val="3">
+          <dgm:forEach name="Name32" axis="follow" ptType="sibTrans" cnt="1">
+            <dgm:layoutNode name="dotNode3">
+              <dgm:alg type="sp"/>
+              <dgm:shape xmlns:r="http://schemas.openxmlformats.org/officeDocument/2006/relationships" r:blip="">
+                <dgm:adjLst/>
+              </dgm:shape>
+              <dgm:presOf/>
+              <dgm:forEach name="Name33" ref="dotRepeat"/>
+            </dgm:layoutNode>
+          </dgm:forEach>
+        </dgm:if>
+        <dgm:else name="Name34"/>
+      </dgm:choose>
+    </dgm:forEach>
+    <dgm:forEach name="Name35" axis="ch" ptType="node" st="4" cnt="1">
+      <dgm:layoutNode name="txNode4" styleLbl="revTx">
+        <dgm:varLst>
+          <dgm:bulletEnabled val="1"/>
+        </dgm:varLst>
+        <dgm:choose name="Name36">
+          <dgm:if name="Name37" axis="self" ptType="node" func="revPos" op="equ" val="1">
+            <dgm:alg type="tx">
+              <dgm:param type="txAnchorVert" val="t"/>
+            </dgm:alg>
+          </dgm:if>
+          <dgm:if name="Name38" axis="self" ptType="node" func="posOdd" op="equ" val="1">
+            <dgm:alg type="tx">
+              <dgm:param type="parTxLTRAlign" val="r"/>
+              <dgm:param type="parTxRTLAlign" val="r"/>
+            </dgm:alg>
+          </dgm:if>
+          <dgm:else name="Name39">
+            <dgm:alg type="tx">
+              <dgm:param type="parTxLTRAlign" val="l"/>
+              <dgm:param type="parTxRTLAlign" val="l"/>
+            </dgm:alg>
+          </dgm:else>
+        </dgm:choose>
+        <dgm:shape xmlns:r="http://schemas.openxmlformats.org/officeDocument/2006/relationships" type="rect" r:blip="" zOrderOff="10">
+          <dgm:adjLst/>
+        </dgm:shape>
+        <dgm:presOf axis="desOrSelf" ptType="node"/>
+        <dgm:constrLst>
+          <dgm:constr type="lMarg" refType="primFontSz" fact="0.1"/>
+          <dgm:constr type="rMarg" refType="primFontSz" fact="0.1"/>
+          <dgm:constr type="tMarg" refType="primFontSz" fact="0.1"/>
+          <dgm:constr type="bMarg" refType="primFontSz" fact="0.1"/>
+        </dgm:constrLst>
+        <dgm:ruleLst>
+          <dgm:rule type="primFontSz" val="5" fact="NaN" max="NaN"/>
+        </dgm:ruleLst>
+      </dgm:layoutNode>
+      <dgm:choose name="Name40">
+        <dgm:if name="Name41" axis="par ch" ptType="all node" func="cnt" op="neq" val="4">
+          <dgm:forEach name="Name42" axis="follow" ptType="sibTrans" cnt="1">
+            <dgm:layoutNode name="dotNode4">
+              <dgm:alg type="sp"/>
+              <dgm:shape xmlns:r="http://schemas.openxmlformats.org/officeDocument/2006/relationships" r:blip="">
+                <dgm:adjLst/>
+              </dgm:shape>
+              <dgm:presOf/>
+              <dgm:forEach name="Name43" ref="dotRepeat"/>
+            </dgm:layoutNode>
+          </dgm:forEach>
+        </dgm:if>
+        <dgm:else name="Name44"/>
+      </dgm:choose>
+    </dgm:forEach>
+    <dgm:forEach name="Name45" axis="ch" ptType="node" st="5" cnt="1">
+      <dgm:layoutNode name="txNode5" styleLbl="revTx">
+        <dgm:varLst>
+          <dgm:bulletEnabled val="1"/>
+        </dgm:varLst>
+        <dgm:choose name="Name46">
+          <dgm:if name="Name47" axis="self" ptType="node" func="revPos" op="equ" val="1">
+            <dgm:alg type="tx">
+              <dgm:param type="txAnchorVert" val="t"/>
+            </dgm:alg>
+          </dgm:if>
+          <dgm:if name="Name48" axis="self" ptType="node" func="posOdd" op="equ" val="1">
+            <dgm:alg type="tx">
+              <dgm:param type="parTxLTRAlign" val="r"/>
+              <dgm:param type="parTxRTLAlign" val="r"/>
+            </dgm:alg>
+          </dgm:if>
+          <dgm:else name="Name49">
+            <dgm:alg type="tx">
+              <dgm:param type="parTxLTRAlign" val="l"/>
+              <dgm:param type="parTxRTLAlign" val="l"/>
+            </dgm:alg>
+          </dgm:else>
+        </dgm:choose>
+        <dgm:shape xmlns:r="http://schemas.openxmlformats.org/officeDocument/2006/relationships" type="rect" r:blip="" zOrderOff="10">
+          <dgm:adjLst/>
+        </dgm:shape>
+        <dgm:presOf axis="desOrSelf" ptType="node"/>
+        <dgm:constrLst>
+          <dgm:constr type="lMarg" refType="primFontSz" fact="0.1"/>
+          <dgm:constr type="rMarg" refType="primFontSz" fact="0.1"/>
+          <dgm:constr type="tMarg" refType="primFontSz" fact="0.1"/>
+          <dgm:constr type="bMarg" refType="primFontSz" fact="0.1"/>
+        </dgm:constrLst>
+        <dgm:ruleLst>
+          <dgm:rule type="primFontSz" val="5" fact="NaN" max="NaN"/>
+        </dgm:ruleLst>
+      </dgm:layoutNode>
+      <dgm:choose name="Name50">
+        <dgm:if name="Name51" axis="par ch" ptType="all node" func="cnt" op="neq" val="5">
+          <dgm:forEach name="Name52" axis="follow" ptType="sibTrans" cnt="1">
+            <dgm:layoutNode name="dotNode5">
+              <dgm:alg type="sp"/>
+              <dgm:shape xmlns:r="http://schemas.openxmlformats.org/officeDocument/2006/relationships" r:blip="">
+                <dgm:adjLst/>
+              </dgm:shape>
+              <dgm:presOf/>
+              <dgm:forEach name="Name53" ref="dotRepeat"/>
+            </dgm:layoutNode>
+          </dgm:forEach>
+        </dgm:if>
+        <dgm:else name="Name54"/>
+      </dgm:choose>
+    </dgm:forEach>
+    <dgm:forEach name="Name55" axis="ch" ptType="node" st="6" cnt="1">
+      <dgm:layoutNode name="txNode6" styleLbl="revTx">
+        <dgm:varLst>
+          <dgm:bulletEnabled val="1"/>
+        </dgm:varLst>
+        <dgm:choose name="Name56">
+          <dgm:if name="Name57" axis="self" ptType="node" func="revPos" op="equ" val="1">
+            <dgm:alg type="tx">
+              <dgm:param type="txAnchorVert" val="t"/>
+            </dgm:alg>
+          </dgm:if>
+          <dgm:if name="Name58" axis="self" ptType="node" func="posOdd" op="equ" val="1">
+            <dgm:alg type="tx">
+              <dgm:param type="parTxLTRAlign" val="r"/>
+              <dgm:param type="parTxRTLAlign" val="r"/>
+            </dgm:alg>
+          </dgm:if>
+          <dgm:else name="Name59">
+            <dgm:alg type="tx">
+              <dgm:param type="parTxLTRAlign" val="l"/>
+              <dgm:param type="parTxRTLAlign" val="l"/>
+            </dgm:alg>
+          </dgm:else>
+        </dgm:choose>
+        <dgm:shape xmlns:r="http://schemas.openxmlformats.org/officeDocument/2006/relationships" type="rect" r:blip="" zOrderOff="10">
+          <dgm:adjLst/>
+        </dgm:shape>
+        <dgm:presOf axis="desOrSelf" ptType="node"/>
+        <dgm:constrLst>
+          <dgm:constr type="lMarg" refType="primFontSz" fact="0.1"/>
+          <dgm:constr type="rMarg" refType="primFontSz" fact="0.1"/>
+          <dgm:constr type="tMarg" refType="primFontSz" fact="0.1"/>
+          <dgm:constr type="bMarg" refType="primFontSz" fact="0.1"/>
+        </dgm:constrLst>
+        <dgm:ruleLst>
+          <dgm:rule type="primFontSz" val="5" fact="NaN" max="NaN"/>
+        </dgm:ruleLst>
+      </dgm:layoutNode>
+      <dgm:choose name="Name60">
+        <dgm:if name="Name61" axis="par ch" ptType="all node" func="cnt" op="neq" val="6">
+          <dgm:forEach name="Name62" axis="follow" ptType="sibTrans" cnt="1">
+            <dgm:layoutNode name="dotNode6">
+              <dgm:alg type="sp"/>
+              <dgm:shape xmlns:r="http://schemas.openxmlformats.org/officeDocument/2006/relationships" r:blip="">
+                <dgm:adjLst/>
+              </dgm:shape>
+              <dgm:presOf/>
+              <dgm:forEach name="Name63" ref="dotRepeat"/>
+            </dgm:layoutNode>
+          </dgm:forEach>
+        </dgm:if>
+        <dgm:else name="Name64"/>
+      </dgm:choose>
+    </dgm:forEach>
+    <dgm:forEach name="Name65" axis="ch" ptType="node" st="7" cnt="1">
+      <dgm:layoutNode name="txNode7" styleLbl="revTx">
+        <dgm:varLst>
+          <dgm:bulletEnabled val="1"/>
+        </dgm:varLst>
+        <dgm:alg type="tx">
+          <dgm:param type="txAnchorVert" val="t"/>
+        </dgm:alg>
+        <dgm:shape xmlns:r="http://schemas.openxmlformats.org/officeDocument/2006/relationships" type="rect" r:blip="" zOrderOff="10">
+          <dgm:adjLst/>
+        </dgm:shape>
+        <dgm:presOf axis="desOrSelf" ptType="node"/>
+        <dgm:constrLst>
+          <dgm:constr type="lMarg" refType="primFontSz" fact="0.1"/>
+          <dgm:constr type="rMarg" refType="primFontSz" fact="0.1"/>
+          <dgm:constr type="tMarg" refType="primFontSz" fact="0.1"/>
+          <dgm:constr type="bMarg" refType="primFontSz" fact="0.1"/>
+        </dgm:constrLst>
+        <dgm:ruleLst>
+          <dgm:rule type="primFontSz" val="5" fact="NaN" max="NaN"/>
+        </dgm:ruleLst>
+      </dgm:layoutNode>
+    </dgm:forEach>
+  </dgm:layoutNode>
+</dgm:layoutDef>
+</file>
+
 <file path=ppt/diagrams/quickStyle1.xml><?xml version="1.0" encoding="utf-8"?>
 <dgm:styleDef xmlns:dgm="http://schemas.openxmlformats.org/drawingml/2006/diagram" xmlns:a="http://schemas.openxmlformats.org/drawingml/2006/main" uniqueId="urn:microsoft.com/office/officeart/2005/8/quickstyle/simple5">
   <dgm:title val=""/>
@@ -12423,6 +14052,1040 @@
 </file>
 
 <file path=ppt/diagrams/quickStyle5.xml><?xml version="1.0" encoding="utf-8"?>
+<dgm:styleDef xmlns:dgm="http://schemas.openxmlformats.org/drawingml/2006/diagram" xmlns:a="http://schemas.openxmlformats.org/drawingml/2006/main" uniqueId="urn:microsoft.com/office/officeart/2005/8/quickstyle/simple5">
+  <dgm:title val=""/>
+  <dgm:desc val=""/>
+  <dgm:catLst>
+    <dgm:cat type="simple" pri="10500"/>
+  </dgm:catLst>
+  <dgm:scene3d>
+    <a:camera prst="orthographicFront"/>
+    <a:lightRig rig="threePt" dir="t"/>
+  </dgm:scene3d>
+  <dgm:styleLbl name="node0">
+    <dgm:scene3d>
+      <a:camera prst="orthographicFront"/>
+      <a:lightRig rig="threePt" dir="t"/>
+    </dgm:scene3d>
+    <dgm:sp3d/>
+    <dgm:txPr/>
+    <dgm:style>
+      <a:lnRef idx="0">
+        <a:scrgbClr r="0" g="0" b="0"/>
+      </a:lnRef>
+      <a:fillRef idx="3">
+        <a:scrgbClr r="0" g="0" b="0"/>
+      </a:fillRef>
+      <a:effectRef idx="3">
+        <a:scrgbClr r="0" g="0" b="0"/>
+      </a:effectRef>
+      <a:fontRef idx="minor">
+        <a:schemeClr val="lt1"/>
+      </a:fontRef>
+    </dgm:style>
+  </dgm:styleLbl>
+  <dgm:styleLbl name="lnNode1">
+    <dgm:scene3d>
+      <a:camera prst="orthographicFront"/>
+      <a:lightRig rig="threePt" dir="t"/>
+    </dgm:scene3d>
+    <dgm:sp3d/>
+    <dgm:txPr/>
+    <dgm:style>
+      <a:lnRef idx="0">
+        <a:scrgbClr r="0" g="0" b="0"/>
+      </a:lnRef>
+      <a:fillRef idx="3">
+        <a:scrgbClr r="0" g="0" b="0"/>
+      </a:fillRef>
+      <a:effectRef idx="3">
+        <a:scrgbClr r="0" g="0" b="0"/>
+      </a:effectRef>
+      <a:fontRef idx="minor">
+        <a:schemeClr val="lt1"/>
+      </a:fontRef>
+    </dgm:style>
+  </dgm:styleLbl>
+  <dgm:styleLbl name="vennNode1">
+    <dgm:scene3d>
+      <a:camera prst="orthographicFront"/>
+      <a:lightRig rig="threePt" dir="t"/>
+    </dgm:scene3d>
+    <dgm:sp3d/>
+    <dgm:txPr/>
+    <dgm:style>
+      <a:lnRef idx="0">
+        <a:scrgbClr r="0" g="0" b="0"/>
+      </a:lnRef>
+      <a:fillRef idx="3">
+        <a:scrgbClr r="0" g="0" b="0"/>
+      </a:fillRef>
+      <a:effectRef idx="3">
+        <a:scrgbClr r="0" g="0" b="0"/>
+      </a:effectRef>
+      <a:fontRef idx="minor">
+        <a:schemeClr val="tx1"/>
+      </a:fontRef>
+    </dgm:style>
+  </dgm:styleLbl>
+  <dgm:styleLbl name="alignNode1">
+    <dgm:scene3d>
+      <a:camera prst="orthographicFront"/>
+      <a:lightRig rig="threePt" dir="t"/>
+    </dgm:scene3d>
+    <dgm:sp3d/>
+    <dgm:txPr/>
+    <dgm:style>
+      <a:lnRef idx="1">
+        <a:scrgbClr r="0" g="0" b="0"/>
+      </a:lnRef>
+      <a:fillRef idx="3">
+        <a:scrgbClr r="0" g="0" b="0"/>
+      </a:fillRef>
+      <a:effectRef idx="3">
+        <a:scrgbClr r="0" g="0" b="0"/>
+      </a:effectRef>
+      <a:fontRef idx="minor">
+        <a:schemeClr val="lt1"/>
+      </a:fontRef>
+    </dgm:style>
+  </dgm:styleLbl>
+  <dgm:styleLbl name="node1">
+    <dgm:scene3d>
+      <a:camera prst="orthographicFront"/>
+      <a:lightRig rig="threePt" dir="t"/>
+    </dgm:scene3d>
+    <dgm:sp3d/>
+    <dgm:txPr/>
+    <dgm:style>
+      <a:lnRef idx="0">
+        <a:scrgbClr r="0" g="0" b="0"/>
+      </a:lnRef>
+      <a:fillRef idx="3">
+        <a:scrgbClr r="0" g="0" b="0"/>
+      </a:fillRef>
+      <a:effectRef idx="3">
+        <a:scrgbClr r="0" g="0" b="0"/>
+      </a:effectRef>
+      <a:fontRef idx="minor">
+        <a:schemeClr val="lt1"/>
+      </a:fontRef>
+    </dgm:style>
+  </dgm:styleLbl>
+  <dgm:styleLbl name="node2">
+    <dgm:scene3d>
+      <a:camera prst="orthographicFront"/>
+      <a:lightRig rig="threePt" dir="t"/>
+    </dgm:scene3d>
+    <dgm:sp3d/>
+    <dgm:txPr/>
+    <dgm:style>
+      <a:lnRef idx="0">
+        <a:scrgbClr r="0" g="0" b="0"/>
+      </a:lnRef>
+      <a:fillRef idx="3">
+        <a:scrgbClr r="0" g="0" b="0"/>
+      </a:fillRef>
+      <a:effectRef idx="3">
+        <a:scrgbClr r="0" g="0" b="0"/>
+      </a:effectRef>
+      <a:fontRef idx="minor">
+        <a:schemeClr val="lt1"/>
+      </a:fontRef>
+    </dgm:style>
+  </dgm:styleLbl>
+  <dgm:styleLbl name="node3">
+    <dgm:scene3d>
+      <a:camera prst="orthographicFront"/>
+      <a:lightRig rig="threePt" dir="t"/>
+    </dgm:scene3d>
+    <dgm:sp3d/>
+    <dgm:txPr/>
+    <dgm:style>
+      <a:lnRef idx="0">
+        <a:scrgbClr r="0" g="0" b="0"/>
+      </a:lnRef>
+      <a:fillRef idx="3">
+        <a:scrgbClr r="0" g="0" b="0"/>
+      </a:fillRef>
+      <a:effectRef idx="3">
+        <a:scrgbClr r="0" g="0" b="0"/>
+      </a:effectRef>
+      <a:fontRef idx="minor">
+        <a:schemeClr val="lt1"/>
+      </a:fontRef>
+    </dgm:style>
+  </dgm:styleLbl>
+  <dgm:styleLbl name="node4">
+    <dgm:scene3d>
+      <a:camera prst="orthographicFront"/>
+      <a:lightRig rig="threePt" dir="t"/>
+    </dgm:scene3d>
+    <dgm:sp3d/>
+    <dgm:txPr/>
+    <dgm:style>
+      <a:lnRef idx="0">
+        <a:scrgbClr r="0" g="0" b="0"/>
+      </a:lnRef>
+      <a:fillRef idx="3">
+        <a:scrgbClr r="0" g="0" b="0"/>
+      </a:fillRef>
+      <a:effectRef idx="3">
+        <a:scrgbClr r="0" g="0" b="0"/>
+      </a:effectRef>
+      <a:fontRef idx="minor">
+        <a:schemeClr val="lt1"/>
+      </a:fontRef>
+    </dgm:style>
+  </dgm:styleLbl>
+  <dgm:styleLbl name="fgImgPlace1">
+    <dgm:scene3d>
+      <a:camera prst="orthographicFront"/>
+      <a:lightRig rig="threePt" dir="t"/>
+    </dgm:scene3d>
+    <dgm:sp3d/>
+    <dgm:txPr/>
+    <dgm:style>
+      <a:lnRef idx="0">
+        <a:scrgbClr r="0" g="0" b="0"/>
+      </a:lnRef>
+      <a:fillRef idx="1">
+        <a:scrgbClr r="0" g="0" b="0"/>
+      </a:fillRef>
+      <a:effectRef idx="3">
+        <a:scrgbClr r="0" g="0" b="0"/>
+      </a:effectRef>
+      <a:fontRef idx="minor"/>
+    </dgm:style>
+  </dgm:styleLbl>
+  <dgm:styleLbl name="alignImgPlace1">
+    <dgm:scene3d>
+      <a:camera prst="orthographicFront"/>
+      <a:lightRig rig="threePt" dir="t"/>
+    </dgm:scene3d>
+    <dgm:sp3d/>
+    <dgm:txPr/>
+    <dgm:style>
+      <a:lnRef idx="0">
+        <a:scrgbClr r="0" g="0" b="0"/>
+      </a:lnRef>
+      <a:fillRef idx="1">
+        <a:scrgbClr r="0" g="0" b="0"/>
+      </a:fillRef>
+      <a:effectRef idx="3">
+        <a:scrgbClr r="0" g="0" b="0"/>
+      </a:effectRef>
+      <a:fontRef idx="minor"/>
+    </dgm:style>
+  </dgm:styleLbl>
+  <dgm:styleLbl name="bgImgPlace1">
+    <dgm:scene3d>
+      <a:camera prst="orthographicFront"/>
+      <a:lightRig rig="threePt" dir="t"/>
+    </dgm:scene3d>
+    <dgm:sp3d/>
+    <dgm:txPr/>
+    <dgm:style>
+      <a:lnRef idx="0">
+        <a:scrgbClr r="0" g="0" b="0"/>
+      </a:lnRef>
+      <a:fillRef idx="1">
+        <a:scrgbClr r="0" g="0" b="0"/>
+      </a:fillRef>
+      <a:effectRef idx="3">
+        <a:scrgbClr r="0" g="0" b="0"/>
+      </a:effectRef>
+      <a:fontRef idx="minor"/>
+    </dgm:style>
+  </dgm:styleLbl>
+  <dgm:styleLbl name="sibTrans2D1">
+    <dgm:scene3d>
+      <a:camera prst="orthographicFront"/>
+      <a:lightRig rig="threePt" dir="t"/>
+    </dgm:scene3d>
+    <dgm:sp3d/>
+    <dgm:txPr/>
+    <dgm:style>
+      <a:lnRef idx="0">
+        <a:scrgbClr r="0" g="0" b="0"/>
+      </a:lnRef>
+      <a:fillRef idx="3">
+        <a:scrgbClr r="0" g="0" b="0"/>
+      </a:fillRef>
+      <a:effectRef idx="3">
+        <a:scrgbClr r="0" g="0" b="0"/>
+      </a:effectRef>
+      <a:fontRef idx="minor">
+        <a:schemeClr val="lt1"/>
+      </a:fontRef>
+    </dgm:style>
+  </dgm:styleLbl>
+  <dgm:styleLbl name="fgSibTrans2D1">
+    <dgm:scene3d>
+      <a:camera prst="orthographicFront"/>
+      <a:lightRig rig="threePt" dir="t"/>
+    </dgm:scene3d>
+    <dgm:sp3d/>
+    <dgm:txPr/>
+    <dgm:style>
+      <a:lnRef idx="0">
+        <a:scrgbClr r="0" g="0" b="0"/>
+      </a:lnRef>
+      <a:fillRef idx="3">
+        <a:scrgbClr r="0" g="0" b="0"/>
+      </a:fillRef>
+      <a:effectRef idx="3">
+        <a:scrgbClr r="0" g="0" b="0"/>
+      </a:effectRef>
+      <a:fontRef idx="minor">
+        <a:schemeClr val="lt1"/>
+      </a:fontRef>
+    </dgm:style>
+  </dgm:styleLbl>
+  <dgm:styleLbl name="bgSibTrans2D1">
+    <dgm:scene3d>
+      <a:camera prst="orthographicFront"/>
+      <a:lightRig rig="threePt" dir="t"/>
+    </dgm:scene3d>
+    <dgm:sp3d/>
+    <dgm:txPr/>
+    <dgm:style>
+      <a:lnRef idx="0">
+        <a:scrgbClr r="0" g="0" b="0"/>
+      </a:lnRef>
+      <a:fillRef idx="3">
+        <a:scrgbClr r="0" g="0" b="0"/>
+      </a:fillRef>
+      <a:effectRef idx="3">
+        <a:scrgbClr r="0" g="0" b="0"/>
+      </a:effectRef>
+      <a:fontRef idx="minor">
+        <a:schemeClr val="lt1"/>
+      </a:fontRef>
+    </dgm:style>
+  </dgm:styleLbl>
+  <dgm:styleLbl name="sibTrans1D1">
+    <dgm:scene3d>
+      <a:camera prst="orthographicFront"/>
+      <a:lightRig rig="threePt" dir="t"/>
+    </dgm:scene3d>
+    <dgm:sp3d/>
+    <dgm:txPr/>
+    <dgm:style>
+      <a:lnRef idx="1">
+        <a:scrgbClr r="0" g="0" b="0"/>
+      </a:lnRef>
+      <a:fillRef idx="0">
+        <a:scrgbClr r="0" g="0" b="0"/>
+      </a:fillRef>
+      <a:effectRef idx="0">
+        <a:scrgbClr r="0" g="0" b="0"/>
+      </a:effectRef>
+      <a:fontRef idx="minor"/>
+    </dgm:style>
+  </dgm:styleLbl>
+  <dgm:styleLbl name="callout">
+    <dgm:scene3d>
+      <a:camera prst="orthographicFront"/>
+      <a:lightRig rig="threePt" dir="t"/>
+    </dgm:scene3d>
+    <dgm:sp3d/>
+    <dgm:txPr/>
+    <dgm:style>
+      <a:lnRef idx="1">
+        <a:scrgbClr r="0" g="0" b="0"/>
+      </a:lnRef>
+      <a:fillRef idx="0">
+        <a:scrgbClr r="0" g="0" b="0"/>
+      </a:fillRef>
+      <a:effectRef idx="1">
+        <a:scrgbClr r="0" g="0" b="0"/>
+      </a:effectRef>
+      <a:fontRef idx="minor"/>
+    </dgm:style>
+  </dgm:styleLbl>
+  <dgm:styleLbl name="asst0">
+    <dgm:scene3d>
+      <a:camera prst="orthographicFront"/>
+      <a:lightRig rig="threePt" dir="t"/>
+    </dgm:scene3d>
+    <dgm:sp3d/>
+    <dgm:txPr/>
+    <dgm:style>
+      <a:lnRef idx="0">
+        <a:scrgbClr r="0" g="0" b="0"/>
+      </a:lnRef>
+      <a:fillRef idx="3">
+        <a:scrgbClr r="0" g="0" b="0"/>
+      </a:fillRef>
+      <a:effectRef idx="3">
+        <a:scrgbClr r="0" g="0" b="0"/>
+      </a:effectRef>
+      <a:fontRef idx="minor">
+        <a:schemeClr val="lt1"/>
+      </a:fontRef>
+    </dgm:style>
+  </dgm:styleLbl>
+  <dgm:styleLbl name="asst1">
+    <dgm:scene3d>
+      <a:camera prst="orthographicFront"/>
+      <a:lightRig rig="threePt" dir="t"/>
+    </dgm:scene3d>
+    <dgm:sp3d/>
+    <dgm:txPr/>
+    <dgm:style>
+      <a:lnRef idx="0">
+        <a:scrgbClr r="0" g="0" b="0"/>
+      </a:lnRef>
+      <a:fillRef idx="3">
+        <a:scrgbClr r="0" g="0" b="0"/>
+      </a:fillRef>
+      <a:effectRef idx="3">
+        <a:scrgbClr r="0" g="0" b="0"/>
+      </a:effectRef>
+      <a:fontRef idx="minor">
+        <a:schemeClr val="lt1"/>
+      </a:fontRef>
+    </dgm:style>
+  </dgm:styleLbl>
+  <dgm:styleLbl name="asst2">
+    <dgm:scene3d>
+      <a:camera prst="orthographicFront"/>
+      <a:lightRig rig="threePt" dir="t"/>
+    </dgm:scene3d>
+    <dgm:sp3d/>
+    <dgm:txPr/>
+    <dgm:style>
+      <a:lnRef idx="0">
+        <a:scrgbClr r="0" g="0" b="0"/>
+      </a:lnRef>
+      <a:fillRef idx="3">
+        <a:scrgbClr r="0" g="0" b="0"/>
+      </a:fillRef>
+      <a:effectRef idx="3">
+        <a:scrgbClr r="0" g="0" b="0"/>
+      </a:effectRef>
+      <a:fontRef idx="minor">
+        <a:schemeClr val="lt1"/>
+      </a:fontRef>
+    </dgm:style>
+  </dgm:styleLbl>
+  <dgm:styleLbl name="asst3">
+    <dgm:scene3d>
+      <a:camera prst="orthographicFront"/>
+      <a:lightRig rig="threePt" dir="t"/>
+    </dgm:scene3d>
+    <dgm:sp3d/>
+    <dgm:txPr/>
+    <dgm:style>
+      <a:lnRef idx="0">
+        <a:scrgbClr r="0" g="0" b="0"/>
+      </a:lnRef>
+      <a:fillRef idx="3">
+        <a:scrgbClr r="0" g="0" b="0"/>
+      </a:fillRef>
+      <a:effectRef idx="3">
+        <a:scrgbClr r="0" g="0" b="0"/>
+      </a:effectRef>
+      <a:fontRef idx="minor">
+        <a:schemeClr val="lt1"/>
+      </a:fontRef>
+    </dgm:style>
+  </dgm:styleLbl>
+  <dgm:styleLbl name="asst4">
+    <dgm:scene3d>
+      <a:camera prst="orthographicFront"/>
+      <a:lightRig rig="threePt" dir="t"/>
+    </dgm:scene3d>
+    <dgm:sp3d/>
+    <dgm:txPr/>
+    <dgm:style>
+      <a:lnRef idx="0">
+        <a:scrgbClr r="0" g="0" b="0"/>
+      </a:lnRef>
+      <a:fillRef idx="3">
+        <a:scrgbClr r="0" g="0" b="0"/>
+      </a:fillRef>
+      <a:effectRef idx="3">
+        <a:scrgbClr r="0" g="0" b="0"/>
+      </a:effectRef>
+      <a:fontRef idx="minor">
+        <a:schemeClr val="lt1"/>
+      </a:fontRef>
+    </dgm:style>
+  </dgm:styleLbl>
+  <dgm:styleLbl name="parChTrans2D1">
+    <dgm:scene3d>
+      <a:camera prst="orthographicFront"/>
+      <a:lightRig rig="threePt" dir="t"/>
+    </dgm:scene3d>
+    <dgm:sp3d/>
+    <dgm:txPr/>
+    <dgm:style>
+      <a:lnRef idx="0">
+        <a:scrgbClr r="0" g="0" b="0"/>
+      </a:lnRef>
+      <a:fillRef idx="3">
+        <a:scrgbClr r="0" g="0" b="0"/>
+      </a:fillRef>
+      <a:effectRef idx="3">
+        <a:scrgbClr r="0" g="0" b="0"/>
+      </a:effectRef>
+      <a:fontRef idx="minor">
+        <a:schemeClr val="lt1"/>
+      </a:fontRef>
+    </dgm:style>
+  </dgm:styleLbl>
+  <dgm:styleLbl name="parChTrans2D2">
+    <dgm:scene3d>
+      <a:camera prst="orthographicFront"/>
+      <a:lightRig rig="threePt" dir="t"/>
+    </dgm:scene3d>
+    <dgm:sp3d/>
+    <dgm:txPr/>
+    <dgm:style>
+      <a:lnRef idx="0">
+        <a:scrgbClr r="0" g="0" b="0"/>
+      </a:lnRef>
+      <a:fillRef idx="3">
+        <a:scrgbClr r="0" g="0" b="0"/>
+      </a:fillRef>
+      <a:effectRef idx="3">
+        <a:scrgbClr r="0" g="0" b="0"/>
+      </a:effectRef>
+      <a:fontRef idx="minor">
+        <a:schemeClr val="lt1"/>
+      </a:fontRef>
+    </dgm:style>
+  </dgm:styleLbl>
+  <dgm:styleLbl name="parChTrans2D3">
+    <dgm:scene3d>
+      <a:camera prst="orthographicFront"/>
+      <a:lightRig rig="threePt" dir="t"/>
+    </dgm:scene3d>
+    <dgm:sp3d/>
+    <dgm:txPr/>
+    <dgm:style>
+      <a:lnRef idx="0">
+        <a:scrgbClr r="0" g="0" b="0"/>
+      </a:lnRef>
+      <a:fillRef idx="3">
+        <a:scrgbClr r="0" g="0" b="0"/>
+      </a:fillRef>
+      <a:effectRef idx="3">
+        <a:scrgbClr r="0" g="0" b="0"/>
+      </a:effectRef>
+      <a:fontRef idx="minor">
+        <a:schemeClr val="lt1"/>
+      </a:fontRef>
+    </dgm:style>
+  </dgm:styleLbl>
+  <dgm:styleLbl name="parChTrans2D4">
+    <dgm:scene3d>
+      <a:camera prst="orthographicFront"/>
+      <a:lightRig rig="threePt" dir="t"/>
+    </dgm:scene3d>
+    <dgm:sp3d/>
+    <dgm:txPr/>
+    <dgm:style>
+      <a:lnRef idx="0">
+        <a:scrgbClr r="0" g="0" b="0"/>
+      </a:lnRef>
+      <a:fillRef idx="3">
+        <a:scrgbClr r="0" g="0" b="0"/>
+      </a:fillRef>
+      <a:effectRef idx="3">
+        <a:scrgbClr r="0" g="0" b="0"/>
+      </a:effectRef>
+      <a:fontRef idx="minor">
+        <a:schemeClr val="lt1"/>
+      </a:fontRef>
+    </dgm:style>
+  </dgm:styleLbl>
+  <dgm:styleLbl name="parChTrans1D1">
+    <dgm:scene3d>
+      <a:camera prst="orthographicFront"/>
+      <a:lightRig rig="threePt" dir="t"/>
+    </dgm:scene3d>
+    <dgm:sp3d/>
+    <dgm:txPr/>
+    <dgm:style>
+      <a:lnRef idx="2">
+        <a:scrgbClr r="0" g="0" b="0"/>
+      </a:lnRef>
+      <a:fillRef idx="0">
+        <a:scrgbClr r="0" g="0" b="0"/>
+      </a:fillRef>
+      <a:effectRef idx="0">
+        <a:scrgbClr r="0" g="0" b="0"/>
+      </a:effectRef>
+      <a:fontRef idx="minor"/>
+    </dgm:style>
+  </dgm:styleLbl>
+  <dgm:styleLbl name="parChTrans1D2">
+    <dgm:scene3d>
+      <a:camera prst="orthographicFront"/>
+      <a:lightRig rig="threePt" dir="t"/>
+    </dgm:scene3d>
+    <dgm:sp3d/>
+    <dgm:txPr/>
+    <dgm:style>
+      <a:lnRef idx="2">
+        <a:scrgbClr r="0" g="0" b="0"/>
+      </a:lnRef>
+      <a:fillRef idx="0">
+        <a:scrgbClr r="0" g="0" b="0"/>
+      </a:fillRef>
+      <a:effectRef idx="0">
+        <a:scrgbClr r="0" g="0" b="0"/>
+      </a:effectRef>
+      <a:fontRef idx="minor"/>
+    </dgm:style>
+  </dgm:styleLbl>
+  <dgm:styleLbl name="parChTrans1D3">
+    <dgm:scene3d>
+      <a:camera prst="orthographicFront"/>
+      <a:lightRig rig="threePt" dir="t"/>
+    </dgm:scene3d>
+    <dgm:sp3d/>
+    <dgm:txPr/>
+    <dgm:style>
+      <a:lnRef idx="2">
+        <a:scrgbClr r="0" g="0" b="0"/>
+      </a:lnRef>
+      <a:fillRef idx="0">
+        <a:scrgbClr r="0" g="0" b="0"/>
+      </a:fillRef>
+      <a:effectRef idx="0">
+        <a:scrgbClr r="0" g="0" b="0"/>
+      </a:effectRef>
+      <a:fontRef idx="minor"/>
+    </dgm:style>
+  </dgm:styleLbl>
+  <dgm:styleLbl name="parChTrans1D4">
+    <dgm:scene3d>
+      <a:camera prst="orthographicFront"/>
+      <a:lightRig rig="threePt" dir="t"/>
+    </dgm:scene3d>
+    <dgm:sp3d/>
+    <dgm:txPr/>
+    <dgm:style>
+      <a:lnRef idx="2">
+        <a:scrgbClr r="0" g="0" b="0"/>
+      </a:lnRef>
+      <a:fillRef idx="0">
+        <a:scrgbClr r="0" g="0" b="0"/>
+      </a:fillRef>
+      <a:effectRef idx="0">
+        <a:scrgbClr r="0" g="0" b="0"/>
+      </a:effectRef>
+      <a:fontRef idx="minor"/>
+    </dgm:style>
+  </dgm:styleLbl>
+  <dgm:styleLbl name="fgAcc1">
+    <dgm:scene3d>
+      <a:camera prst="orthographicFront"/>
+      <a:lightRig rig="threePt" dir="t"/>
+    </dgm:scene3d>
+    <dgm:sp3d/>
+    <dgm:txPr/>
+    <dgm:style>
+      <a:lnRef idx="1">
+        <a:scrgbClr r="0" g="0" b="0"/>
+      </a:lnRef>
+      <a:fillRef idx="1">
+        <a:scrgbClr r="0" g="0" b="0"/>
+      </a:fillRef>
+      <a:effectRef idx="2">
+        <a:scrgbClr r="0" g="0" b="0"/>
+      </a:effectRef>
+      <a:fontRef idx="minor"/>
+    </dgm:style>
+  </dgm:styleLbl>
+  <dgm:styleLbl name="conFgAcc1">
+    <dgm:scene3d>
+      <a:camera prst="orthographicFront"/>
+      <a:lightRig rig="threePt" dir="t"/>
+    </dgm:scene3d>
+    <dgm:sp3d/>
+    <dgm:txPr/>
+    <dgm:style>
+      <a:lnRef idx="1">
+        <a:scrgbClr r="0" g="0" b="0"/>
+      </a:lnRef>
+      <a:fillRef idx="1">
+        <a:scrgbClr r="0" g="0" b="0"/>
+      </a:fillRef>
+      <a:effectRef idx="2">
+        <a:scrgbClr r="0" g="0" b="0"/>
+      </a:effectRef>
+      <a:fontRef idx="minor"/>
+    </dgm:style>
+  </dgm:styleLbl>
+  <dgm:styleLbl name="alignAcc1">
+    <dgm:scene3d>
+      <a:camera prst="orthographicFront"/>
+      <a:lightRig rig="threePt" dir="t"/>
+    </dgm:scene3d>
+    <dgm:sp3d/>
+    <dgm:txPr/>
+    <dgm:style>
+      <a:lnRef idx="1">
+        <a:scrgbClr r="0" g="0" b="0"/>
+      </a:lnRef>
+      <a:fillRef idx="1">
+        <a:scrgbClr r="0" g="0" b="0"/>
+      </a:fillRef>
+      <a:effectRef idx="2">
+        <a:scrgbClr r="0" g="0" b="0"/>
+      </a:effectRef>
+      <a:fontRef idx="minor"/>
+    </dgm:style>
+  </dgm:styleLbl>
+  <dgm:styleLbl name="trAlignAcc1">
+    <dgm:scene3d>
+      <a:camera prst="orthographicFront"/>
+      <a:lightRig rig="threePt" dir="t"/>
+    </dgm:scene3d>
+    <dgm:sp3d/>
+    <dgm:txPr/>
+    <dgm:style>
+      <a:lnRef idx="1">
+        <a:scrgbClr r="0" g="0" b="0"/>
+      </a:lnRef>
+      <a:fillRef idx="1">
+        <a:scrgbClr r="0" g="0" b="0"/>
+      </a:fillRef>
+      <a:effectRef idx="0">
+        <a:scrgbClr r="0" g="0" b="0"/>
+      </a:effectRef>
+      <a:fontRef idx="minor"/>
+    </dgm:style>
+  </dgm:styleLbl>
+  <dgm:styleLbl name="bgAcc1">
+    <dgm:scene3d>
+      <a:camera prst="orthographicFront"/>
+      <a:lightRig rig="threePt" dir="t"/>
+    </dgm:scene3d>
+    <dgm:sp3d/>
+    <dgm:txPr/>
+    <dgm:style>
+      <a:lnRef idx="1">
+        <a:scrgbClr r="0" g="0" b="0"/>
+      </a:lnRef>
+      <a:fillRef idx="1">
+        <a:scrgbClr r="0" g="0" b="0"/>
+      </a:fillRef>
+      <a:effectRef idx="2">
+        <a:scrgbClr r="0" g="0" b="0"/>
+      </a:effectRef>
+      <a:fontRef idx="minor"/>
+    </dgm:style>
+  </dgm:styleLbl>
+  <dgm:styleLbl name="solidFgAcc1">
+    <dgm:scene3d>
+      <a:camera prst="orthographicFront"/>
+      <a:lightRig rig="threePt" dir="t"/>
+    </dgm:scene3d>
+    <dgm:sp3d/>
+    <dgm:txPr/>
+    <dgm:style>
+      <a:lnRef idx="1">
+        <a:scrgbClr r="0" g="0" b="0"/>
+      </a:lnRef>
+      <a:fillRef idx="1">
+        <a:scrgbClr r="0" g="0" b="0"/>
+      </a:fillRef>
+      <a:effectRef idx="2">
+        <a:scrgbClr r="0" g="0" b="0"/>
+      </a:effectRef>
+      <a:fontRef idx="minor"/>
+    </dgm:style>
+  </dgm:styleLbl>
+  <dgm:styleLbl name="solidAlignAcc1">
+    <dgm:scene3d>
+      <a:camera prst="orthographicFront"/>
+      <a:lightRig rig="threePt" dir="t"/>
+    </dgm:scene3d>
+    <dgm:sp3d/>
+    <dgm:txPr/>
+    <dgm:style>
+      <a:lnRef idx="1">
+        <a:scrgbClr r="0" g="0" b="0"/>
+      </a:lnRef>
+      <a:fillRef idx="1">
+        <a:scrgbClr r="0" g="0" b="0"/>
+      </a:fillRef>
+      <a:effectRef idx="3">
+        <a:scrgbClr r="0" g="0" b="0"/>
+      </a:effectRef>
+      <a:fontRef idx="minor"/>
+    </dgm:style>
+  </dgm:styleLbl>
+  <dgm:styleLbl name="solidBgAcc1">
+    <dgm:scene3d>
+      <a:camera prst="orthographicFront"/>
+      <a:lightRig rig="threePt" dir="t"/>
+    </dgm:scene3d>
+    <dgm:sp3d/>
+    <dgm:txPr/>
+    <dgm:style>
+      <a:lnRef idx="1">
+        <a:scrgbClr r="0" g="0" b="0"/>
+      </a:lnRef>
+      <a:fillRef idx="1">
+        <a:scrgbClr r="0" g="0" b="0"/>
+      </a:fillRef>
+      <a:effectRef idx="3">
+        <a:scrgbClr r="0" g="0" b="0"/>
+      </a:effectRef>
+      <a:fontRef idx="minor"/>
+    </dgm:style>
+  </dgm:styleLbl>
+  <dgm:styleLbl name="fgAccFollowNode1">
+    <dgm:scene3d>
+      <a:camera prst="orthographicFront"/>
+      <a:lightRig rig="threePt" dir="t"/>
+    </dgm:scene3d>
+    <dgm:sp3d/>
+    <dgm:txPr/>
+    <dgm:style>
+      <a:lnRef idx="1">
+        <a:scrgbClr r="0" g="0" b="0"/>
+      </a:lnRef>
+      <a:fillRef idx="1">
+        <a:scrgbClr r="0" g="0" b="0"/>
+      </a:fillRef>
+      <a:effectRef idx="2">
+        <a:scrgbClr r="0" g="0" b="0"/>
+      </a:effectRef>
+      <a:fontRef idx="minor"/>
+    </dgm:style>
+  </dgm:styleLbl>
+  <dgm:styleLbl name="alignAccFollowNode1">
+    <dgm:scene3d>
+      <a:camera prst="orthographicFront"/>
+      <a:lightRig rig="threePt" dir="t"/>
+    </dgm:scene3d>
+    <dgm:sp3d/>
+    <dgm:txPr/>
+    <dgm:style>
+      <a:lnRef idx="1">
+        <a:scrgbClr r="0" g="0" b="0"/>
+      </a:lnRef>
+      <a:fillRef idx="1">
+        <a:scrgbClr r="0" g="0" b="0"/>
+      </a:fillRef>
+      <a:effectRef idx="2">
+        <a:scrgbClr r="0" g="0" b="0"/>
+      </a:effectRef>
+      <a:fontRef idx="minor"/>
+    </dgm:style>
+  </dgm:styleLbl>
+  <dgm:styleLbl name="bgAccFollowNode1">
+    <dgm:scene3d>
+      <a:camera prst="orthographicFront"/>
+      <a:lightRig rig="threePt" dir="t"/>
+    </dgm:scene3d>
+    <dgm:sp3d/>
+    <dgm:txPr/>
+    <dgm:style>
+      <a:lnRef idx="1">
+        <a:scrgbClr r="0" g="0" b="0"/>
+      </a:lnRef>
+      <a:fillRef idx="1">
+        <a:scrgbClr r="0" g="0" b="0"/>
+      </a:fillRef>
+      <a:effectRef idx="2">
+        <a:scrgbClr r="0" g="0" b="0"/>
+      </a:effectRef>
+      <a:fontRef idx="minor"/>
+    </dgm:style>
+  </dgm:styleLbl>
+  <dgm:styleLbl name="fgAcc0">
+    <dgm:scene3d>
+      <a:camera prst="orthographicFront"/>
+      <a:lightRig rig="threePt" dir="t"/>
+    </dgm:scene3d>
+    <dgm:sp3d/>
+    <dgm:txPr/>
+    <dgm:style>
+      <a:lnRef idx="1">
+        <a:scrgbClr r="0" g="0" b="0"/>
+      </a:lnRef>
+      <a:fillRef idx="1">
+        <a:scrgbClr r="0" g="0" b="0"/>
+      </a:fillRef>
+      <a:effectRef idx="2">
+        <a:scrgbClr r="0" g="0" b="0"/>
+      </a:effectRef>
+      <a:fontRef idx="minor"/>
+    </dgm:style>
+  </dgm:styleLbl>
+  <dgm:styleLbl name="fgAcc2">
+    <dgm:scene3d>
+      <a:camera prst="orthographicFront"/>
+      <a:lightRig rig="threePt" dir="t"/>
+    </dgm:scene3d>
+    <dgm:sp3d/>
+    <dgm:txPr/>
+    <dgm:style>
+      <a:lnRef idx="1">
+        <a:scrgbClr r="0" g="0" b="0"/>
+      </a:lnRef>
+      <a:fillRef idx="1">
+        <a:scrgbClr r="0" g="0" b="0"/>
+      </a:fillRef>
+      <a:effectRef idx="2">
+        <a:scrgbClr r="0" g="0" b="0"/>
+      </a:effectRef>
+      <a:fontRef idx="minor"/>
+    </dgm:style>
+  </dgm:styleLbl>
+  <dgm:styleLbl name="fgAcc3">
+    <dgm:scene3d>
+      <a:camera prst="orthographicFront"/>
+      <a:lightRig rig="threePt" dir="t"/>
+    </dgm:scene3d>
+    <dgm:sp3d/>
+    <dgm:txPr/>
+    <dgm:style>
+      <a:lnRef idx="1">
+        <a:scrgbClr r="0" g="0" b="0"/>
+      </a:lnRef>
+      <a:fillRef idx="1">
+        <a:scrgbClr r="0" g="0" b="0"/>
+      </a:fillRef>
+      <a:effectRef idx="2">
+        <a:scrgbClr r="0" g="0" b="0"/>
+      </a:effectRef>
+      <a:fontRef idx="minor"/>
+    </dgm:style>
+  </dgm:styleLbl>
+  <dgm:styleLbl name="fgAcc4">
+    <dgm:scene3d>
+      <a:camera prst="orthographicFront"/>
+      <a:lightRig rig="threePt" dir="t"/>
+    </dgm:scene3d>
+    <dgm:sp3d/>
+    <dgm:txPr/>
+    <dgm:style>
+      <a:lnRef idx="1">
+        <a:scrgbClr r="0" g="0" b="0"/>
+      </a:lnRef>
+      <a:fillRef idx="1">
+        <a:scrgbClr r="0" g="0" b="0"/>
+      </a:fillRef>
+      <a:effectRef idx="2">
+        <a:scrgbClr r="0" g="0" b="0"/>
+      </a:effectRef>
+      <a:fontRef idx="minor"/>
+    </dgm:style>
+  </dgm:styleLbl>
+  <dgm:styleLbl name="bgShp">
+    <dgm:scene3d>
+      <a:camera prst="orthographicFront"/>
+      <a:lightRig rig="threePt" dir="t"/>
+    </dgm:scene3d>
+    <dgm:sp3d/>
+    <dgm:txPr/>
+    <dgm:style>
+      <a:lnRef idx="0">
+        <a:scrgbClr r="0" g="0" b="0"/>
+      </a:lnRef>
+      <a:fillRef idx="1">
+        <a:scrgbClr r="0" g="0" b="0"/>
+      </a:fillRef>
+      <a:effectRef idx="2">
+        <a:scrgbClr r="0" g="0" b="0"/>
+      </a:effectRef>
+      <a:fontRef idx="minor"/>
+    </dgm:style>
+  </dgm:styleLbl>
+  <dgm:styleLbl name="dkBgShp">
+    <dgm:scene3d>
+      <a:camera prst="orthographicFront"/>
+      <a:lightRig rig="threePt" dir="t"/>
+    </dgm:scene3d>
+    <dgm:sp3d/>
+    <dgm:txPr/>
+    <dgm:style>
+      <a:lnRef idx="0">
+        <a:scrgbClr r="0" g="0" b="0"/>
+      </a:lnRef>
+      <a:fillRef idx="1">
+        <a:scrgbClr r="0" g="0" b="0"/>
+      </a:fillRef>
+      <a:effectRef idx="3">
+        <a:scrgbClr r="0" g="0" b="0"/>
+      </a:effectRef>
+      <a:fontRef idx="minor"/>
+    </dgm:style>
+  </dgm:styleLbl>
+  <dgm:styleLbl name="trBgShp">
+    <dgm:scene3d>
+      <a:camera prst="orthographicFront"/>
+      <a:lightRig rig="threePt" dir="t"/>
+    </dgm:scene3d>
+    <dgm:sp3d/>
+    <dgm:txPr/>
+    <dgm:style>
+      <a:lnRef idx="0">
+        <a:scrgbClr r="0" g="0" b="0"/>
+      </a:lnRef>
+      <a:fillRef idx="1">
+        <a:scrgbClr r="0" g="0" b="0"/>
+      </a:fillRef>
+      <a:effectRef idx="0">
+        <a:scrgbClr r="0" g="0" b="0"/>
+      </a:effectRef>
+      <a:fontRef idx="minor"/>
+    </dgm:style>
+  </dgm:styleLbl>
+  <dgm:styleLbl name="fgShp">
+    <dgm:scene3d>
+      <a:camera prst="orthographicFront"/>
+      <a:lightRig rig="threePt" dir="t"/>
+    </dgm:scene3d>
+    <dgm:sp3d/>
+    <dgm:txPr/>
+    <dgm:style>
+      <a:lnRef idx="0">
+        <a:scrgbClr r="0" g="0" b="0"/>
+      </a:lnRef>
+      <a:fillRef idx="3">
+        <a:scrgbClr r="0" g="0" b="0"/>
+      </a:fillRef>
+      <a:effectRef idx="3">
+        <a:scrgbClr r="0" g="0" b="0"/>
+      </a:effectRef>
+      <a:fontRef idx="minor"/>
+    </dgm:style>
+  </dgm:styleLbl>
+  <dgm:styleLbl name="revTx">
+    <dgm:scene3d>
+      <a:camera prst="orthographicFront"/>
+      <a:lightRig rig="threePt" dir="t"/>
+    </dgm:scene3d>
+    <dgm:sp3d/>
+    <dgm:txPr/>
+    <dgm:style>
+      <a:lnRef idx="0">
+        <a:scrgbClr r="0" g="0" b="0"/>
+      </a:lnRef>
+      <a:fillRef idx="0">
+        <a:scrgbClr r="0" g="0" b="0"/>
+      </a:fillRef>
+      <a:effectRef idx="0">
+        <a:scrgbClr r="0" g="0" b="0"/>
+      </a:effectRef>
+      <a:fontRef idx="minor"/>
+    </dgm:style>
+  </dgm:styleLbl>
+</dgm:styleDef>
+</file>
+
+<file path=ppt/diagrams/quickStyle6.xml><?xml version="1.0" encoding="utf-8"?>
 <dgm:styleDef xmlns:dgm="http://schemas.openxmlformats.org/drawingml/2006/diagram" xmlns:a="http://schemas.openxmlformats.org/drawingml/2006/main" uniqueId="urn:microsoft.com/office/officeart/2005/8/quickstyle/simple5">
   <dgm:title val=""/>
   <dgm:desc val=""/>
@@ -13603,7 +16266,7 @@
           <a:p>
             <a:fld id="{8E0B0FF3-F732-45F2-B11D-D6174962F344}" type="datetimeFigureOut">
               <a:rPr lang="en-US" smtClean="0"/>
-              <a:t>9/2/2019</a:t>
+              <a:t>9/3/2019</a:t>
             </a:fld>
             <a:endParaRPr lang="en-US"/>
           </a:p>
@@ -13801,7 +16464,7 @@
           <a:p>
             <a:fld id="{8E0B0FF3-F732-45F2-B11D-D6174962F344}" type="datetimeFigureOut">
               <a:rPr lang="en-US" smtClean="0"/>
-              <a:t>9/2/2019</a:t>
+              <a:t>9/3/2019</a:t>
             </a:fld>
             <a:endParaRPr lang="en-US"/>
           </a:p>
@@ -14009,7 +16672,7 @@
           <a:p>
             <a:fld id="{8E0B0FF3-F732-45F2-B11D-D6174962F344}" type="datetimeFigureOut">
               <a:rPr lang="en-US" smtClean="0"/>
-              <a:t>9/2/2019</a:t>
+              <a:t>9/3/2019</a:t>
             </a:fld>
             <a:endParaRPr lang="en-US"/>
           </a:p>
@@ -14207,7 +16870,7 @@
           <a:p>
             <a:fld id="{8E0B0FF3-F732-45F2-B11D-D6174962F344}" type="datetimeFigureOut">
               <a:rPr lang="en-US" smtClean="0"/>
-              <a:t>9/2/2019</a:t>
+              <a:t>9/3/2019</a:t>
             </a:fld>
             <a:endParaRPr lang="en-US"/>
           </a:p>
@@ -14482,7 +17145,7 @@
           <a:p>
             <a:fld id="{8E0B0FF3-F732-45F2-B11D-D6174962F344}" type="datetimeFigureOut">
               <a:rPr lang="en-US" smtClean="0"/>
-              <a:t>9/2/2019</a:t>
+              <a:t>9/3/2019</a:t>
             </a:fld>
             <a:endParaRPr lang="en-US"/>
           </a:p>
@@ -14747,7 +17410,7 @@
           <a:p>
             <a:fld id="{8E0B0FF3-F732-45F2-B11D-D6174962F344}" type="datetimeFigureOut">
               <a:rPr lang="en-US" smtClean="0"/>
-              <a:t>9/2/2019</a:t>
+              <a:t>9/3/2019</a:t>
             </a:fld>
             <a:endParaRPr lang="en-US"/>
           </a:p>
@@ -15159,7 +17822,7 @@
           <a:p>
             <a:fld id="{8E0B0FF3-F732-45F2-B11D-D6174962F344}" type="datetimeFigureOut">
               <a:rPr lang="en-US" smtClean="0"/>
-              <a:t>9/2/2019</a:t>
+              <a:t>9/3/2019</a:t>
             </a:fld>
             <a:endParaRPr lang="en-US"/>
           </a:p>
@@ -15300,7 +17963,7 @@
           <a:p>
             <a:fld id="{8E0B0FF3-F732-45F2-B11D-D6174962F344}" type="datetimeFigureOut">
               <a:rPr lang="en-US" smtClean="0"/>
-              <a:t>9/2/2019</a:t>
+              <a:t>9/3/2019</a:t>
             </a:fld>
             <a:endParaRPr lang="en-US"/>
           </a:p>
@@ -15413,7 +18076,7 @@
           <a:p>
             <a:fld id="{8E0B0FF3-F732-45F2-B11D-D6174962F344}" type="datetimeFigureOut">
               <a:rPr lang="en-US" smtClean="0"/>
-              <a:t>9/2/2019</a:t>
+              <a:t>9/3/2019</a:t>
             </a:fld>
             <a:endParaRPr lang="en-US"/>
           </a:p>
@@ -15724,7 +18387,7 @@
           <a:p>
             <a:fld id="{8E0B0FF3-F732-45F2-B11D-D6174962F344}" type="datetimeFigureOut">
               <a:rPr lang="en-US" smtClean="0"/>
-              <a:t>9/2/2019</a:t>
+              <a:t>9/3/2019</a:t>
             </a:fld>
             <a:endParaRPr lang="en-US"/>
           </a:p>
@@ -16012,7 +18675,7 @@
           <a:p>
             <a:fld id="{8E0B0FF3-F732-45F2-B11D-D6174962F344}" type="datetimeFigureOut">
               <a:rPr lang="en-US" smtClean="0"/>
-              <a:t>9/2/2019</a:t>
+              <a:t>9/3/2019</a:t>
             </a:fld>
             <a:endParaRPr lang="en-US"/>
           </a:p>
@@ -16253,7 +18916,7 @@
           <a:p>
             <a:fld id="{8E0B0FF3-F732-45F2-B11D-D6174962F344}" type="datetimeFigureOut">
               <a:rPr lang="en-US" smtClean="0"/>
-              <a:t>9/2/2019</a:t>
+              <a:t>9/3/2019</a:t>
             </a:fld>
             <a:endParaRPr lang="en-US"/>
           </a:p>
@@ -16672,10 +19335,10 @@
       </p:grpSpPr>
       <p:pic>
         <p:nvPicPr>
-          <p:cNvPr id="31" name="Picture 30">
+          <p:cNvPr id="3" name="Picture 2">
             <a:extLst>
               <a:ext uri="{FF2B5EF4-FFF2-40B4-BE49-F238E27FC236}">
-                <a16:creationId xmlns:a16="http://schemas.microsoft.com/office/drawing/2014/main" id="{B13CF9A2-D202-45B0-A7BB-FEE72F4E1441}"/>
+                <a16:creationId xmlns:a16="http://schemas.microsoft.com/office/drawing/2014/main" id="{F8BE1249-2A5C-4937-97FC-642622781AE4}"/>
               </a:ext>
             </a:extLst>
           </p:cNvPr>
@@ -16692,8 +19355,8 @@
         </p:blipFill>
         <p:spPr>
           <a:xfrm>
-            <a:off x="860552" y="366708"/>
-            <a:ext cx="10470895" cy="5589475"/>
+            <a:off x="875950" y="387099"/>
+            <a:ext cx="10534289" cy="5569083"/>
           </a:xfrm>
           <a:prstGeom prst="rect">
             <a:avLst/>
@@ -16713,14 +19376,449 @@
           <p:nvPr>
             <p:extLst>
               <p:ext uri="{D42A27DB-BD31-4B8C-83A1-F6EECF244321}">
-                <p14:modId xmlns:p14="http://schemas.microsoft.com/office/powerpoint/2010/main" val="3400548264"/>
+                <p14:modId xmlns:p14="http://schemas.microsoft.com/office/powerpoint/2010/main" val="3561467940"/>
               </p:ext>
             </p:extLst>
           </p:nvPr>
         </p:nvGraphicFramePr>
         <p:xfrm>
-          <a:off x="1209646" y="124048"/>
-          <a:ext cx="3320177" cy="6367244"/>
+          <a:off x="1170656" y="387098"/>
+          <a:ext cx="3320177" cy="5530127"/>
+        </p:xfrm>
+        <a:graphic>
+          <a:graphicData uri="http://schemas.openxmlformats.org/drawingml/2006/diagram">
+            <dgm:relIds xmlns:dgm="http://schemas.openxmlformats.org/drawingml/2006/diagram" xmlns:r="http://schemas.openxmlformats.org/officeDocument/2006/relationships" r:dm="rId3" r:lo="rId4" r:qs="rId5" r:cs="rId6"/>
+          </a:graphicData>
+        </a:graphic>
+      </p:graphicFrame>
+      <p:sp>
+        <p:nvSpPr>
+          <p:cNvPr id="20" name="TextBox 19">
+            <a:extLst>
+              <a:ext uri="{FF2B5EF4-FFF2-40B4-BE49-F238E27FC236}">
+                <a16:creationId xmlns:a16="http://schemas.microsoft.com/office/drawing/2014/main" id="{1B20F288-0228-48CC-8F27-414DF01421FD}"/>
+              </a:ext>
+            </a:extLst>
+          </p:cNvPr>
+          <p:cNvSpPr txBox="1"/>
+          <p:nvPr/>
+        </p:nvSpPr>
+        <p:spPr>
+          <a:xfrm>
+            <a:off x="2830744" y="676825"/>
+            <a:ext cx="6974641" cy="1015663"/>
+          </a:xfrm>
+          <a:custGeom>
+            <a:avLst/>
+            <a:gdLst>
+              <a:gd name="connsiteX0" fmla="*/ 0 w 6974641"/>
+              <a:gd name="connsiteY0" fmla="*/ 0 h 1015663"/>
+              <a:gd name="connsiteX1" fmla="*/ 650966 w 6974641"/>
+              <a:gd name="connsiteY1" fmla="*/ 0 h 1015663"/>
+              <a:gd name="connsiteX2" fmla="*/ 1022947 w 6974641"/>
+              <a:gd name="connsiteY2" fmla="*/ 0 h 1015663"/>
+              <a:gd name="connsiteX3" fmla="*/ 1604167 w 6974641"/>
+              <a:gd name="connsiteY3" fmla="*/ 0 h 1015663"/>
+              <a:gd name="connsiteX4" fmla="*/ 2115641 w 6974641"/>
+              <a:gd name="connsiteY4" fmla="*/ 0 h 1015663"/>
+              <a:gd name="connsiteX5" fmla="*/ 2487622 w 6974641"/>
+              <a:gd name="connsiteY5" fmla="*/ 0 h 1015663"/>
+              <a:gd name="connsiteX6" fmla="*/ 3208335 w 6974641"/>
+              <a:gd name="connsiteY6" fmla="*/ 0 h 1015663"/>
+              <a:gd name="connsiteX7" fmla="*/ 3719809 w 6974641"/>
+              <a:gd name="connsiteY7" fmla="*/ 0 h 1015663"/>
+              <a:gd name="connsiteX8" fmla="*/ 4370775 w 6974641"/>
+              <a:gd name="connsiteY8" fmla="*/ 0 h 1015663"/>
+              <a:gd name="connsiteX9" fmla="*/ 4882249 w 6974641"/>
+              <a:gd name="connsiteY9" fmla="*/ 0 h 1015663"/>
+              <a:gd name="connsiteX10" fmla="*/ 5323976 w 6974641"/>
+              <a:gd name="connsiteY10" fmla="*/ 0 h 1015663"/>
+              <a:gd name="connsiteX11" fmla="*/ 6044689 w 6974641"/>
+              <a:gd name="connsiteY11" fmla="*/ 0 h 1015663"/>
+              <a:gd name="connsiteX12" fmla="*/ 6974641 w 6974641"/>
+              <a:gd name="connsiteY12" fmla="*/ 0 h 1015663"/>
+              <a:gd name="connsiteX13" fmla="*/ 6974641 w 6974641"/>
+              <a:gd name="connsiteY13" fmla="*/ 497675 h 1015663"/>
+              <a:gd name="connsiteX14" fmla="*/ 6974641 w 6974641"/>
+              <a:gd name="connsiteY14" fmla="*/ 1015663 h 1015663"/>
+              <a:gd name="connsiteX15" fmla="*/ 6253928 w 6974641"/>
+              <a:gd name="connsiteY15" fmla="*/ 1015663 h 1015663"/>
+              <a:gd name="connsiteX16" fmla="*/ 5881947 w 6974641"/>
+              <a:gd name="connsiteY16" fmla="*/ 1015663 h 1015663"/>
+              <a:gd name="connsiteX17" fmla="*/ 5370474 w 6974641"/>
+              <a:gd name="connsiteY17" fmla="*/ 1015663 h 1015663"/>
+              <a:gd name="connsiteX18" fmla="*/ 4998493 w 6974641"/>
+              <a:gd name="connsiteY18" fmla="*/ 1015663 h 1015663"/>
+              <a:gd name="connsiteX19" fmla="*/ 4347526 w 6974641"/>
+              <a:gd name="connsiteY19" fmla="*/ 1015663 h 1015663"/>
+              <a:gd name="connsiteX20" fmla="*/ 3836053 w 6974641"/>
+              <a:gd name="connsiteY20" fmla="*/ 1015663 h 1015663"/>
+              <a:gd name="connsiteX21" fmla="*/ 3324579 w 6974641"/>
+              <a:gd name="connsiteY21" fmla="*/ 1015663 h 1015663"/>
+              <a:gd name="connsiteX22" fmla="*/ 2952598 w 6974641"/>
+              <a:gd name="connsiteY22" fmla="*/ 1015663 h 1015663"/>
+              <a:gd name="connsiteX23" fmla="*/ 2441124 w 6974641"/>
+              <a:gd name="connsiteY23" fmla="*/ 1015663 h 1015663"/>
+              <a:gd name="connsiteX24" fmla="*/ 1859904 w 6974641"/>
+              <a:gd name="connsiteY24" fmla="*/ 1015663 h 1015663"/>
+              <a:gd name="connsiteX25" fmla="*/ 1208938 w 6974641"/>
+              <a:gd name="connsiteY25" fmla="*/ 1015663 h 1015663"/>
+              <a:gd name="connsiteX26" fmla="*/ 0 w 6974641"/>
+              <a:gd name="connsiteY26" fmla="*/ 1015663 h 1015663"/>
+              <a:gd name="connsiteX27" fmla="*/ 0 w 6974641"/>
+              <a:gd name="connsiteY27" fmla="*/ 497675 h 1015663"/>
+              <a:gd name="connsiteX28" fmla="*/ 0 w 6974641"/>
+              <a:gd name="connsiteY28" fmla="*/ 0 h 1015663"/>
+            </a:gdLst>
+            <a:ahLst/>
+            <a:cxnLst>
+              <a:cxn ang="0">
+                <a:pos x="connsiteX0" y="connsiteY0"/>
+              </a:cxn>
+              <a:cxn ang="0">
+                <a:pos x="connsiteX1" y="connsiteY1"/>
+              </a:cxn>
+              <a:cxn ang="0">
+                <a:pos x="connsiteX2" y="connsiteY2"/>
+              </a:cxn>
+              <a:cxn ang="0">
+                <a:pos x="connsiteX3" y="connsiteY3"/>
+              </a:cxn>
+              <a:cxn ang="0">
+                <a:pos x="connsiteX4" y="connsiteY4"/>
+              </a:cxn>
+              <a:cxn ang="0">
+                <a:pos x="connsiteX5" y="connsiteY5"/>
+              </a:cxn>
+              <a:cxn ang="0">
+                <a:pos x="connsiteX6" y="connsiteY6"/>
+              </a:cxn>
+              <a:cxn ang="0">
+                <a:pos x="connsiteX7" y="connsiteY7"/>
+              </a:cxn>
+              <a:cxn ang="0">
+                <a:pos x="connsiteX8" y="connsiteY8"/>
+              </a:cxn>
+              <a:cxn ang="0">
+                <a:pos x="connsiteX9" y="connsiteY9"/>
+              </a:cxn>
+              <a:cxn ang="0">
+                <a:pos x="connsiteX10" y="connsiteY10"/>
+              </a:cxn>
+              <a:cxn ang="0">
+                <a:pos x="connsiteX11" y="connsiteY11"/>
+              </a:cxn>
+              <a:cxn ang="0">
+                <a:pos x="connsiteX12" y="connsiteY12"/>
+              </a:cxn>
+              <a:cxn ang="0">
+                <a:pos x="connsiteX13" y="connsiteY13"/>
+              </a:cxn>
+              <a:cxn ang="0">
+                <a:pos x="connsiteX14" y="connsiteY14"/>
+              </a:cxn>
+              <a:cxn ang="0">
+                <a:pos x="connsiteX15" y="connsiteY15"/>
+              </a:cxn>
+              <a:cxn ang="0">
+                <a:pos x="connsiteX16" y="connsiteY16"/>
+              </a:cxn>
+              <a:cxn ang="0">
+                <a:pos x="connsiteX17" y="connsiteY17"/>
+              </a:cxn>
+              <a:cxn ang="0">
+                <a:pos x="connsiteX18" y="connsiteY18"/>
+              </a:cxn>
+              <a:cxn ang="0">
+                <a:pos x="connsiteX19" y="connsiteY19"/>
+              </a:cxn>
+              <a:cxn ang="0">
+                <a:pos x="connsiteX20" y="connsiteY20"/>
+              </a:cxn>
+              <a:cxn ang="0">
+                <a:pos x="connsiteX21" y="connsiteY21"/>
+              </a:cxn>
+              <a:cxn ang="0">
+                <a:pos x="connsiteX22" y="connsiteY22"/>
+              </a:cxn>
+              <a:cxn ang="0">
+                <a:pos x="connsiteX23" y="connsiteY23"/>
+              </a:cxn>
+              <a:cxn ang="0">
+                <a:pos x="connsiteX24" y="connsiteY24"/>
+              </a:cxn>
+              <a:cxn ang="0">
+                <a:pos x="connsiteX25" y="connsiteY25"/>
+              </a:cxn>
+              <a:cxn ang="0">
+                <a:pos x="connsiteX26" y="connsiteY26"/>
+              </a:cxn>
+              <a:cxn ang="0">
+                <a:pos x="connsiteX27" y="connsiteY27"/>
+              </a:cxn>
+              <a:cxn ang="0">
+                <a:pos x="connsiteX28" y="connsiteY28"/>
+              </a:cxn>
+            </a:cxnLst>
+            <a:rect l="l" t="t" r="r" b="b"/>
+            <a:pathLst>
+              <a:path w="6974641" h="1015663" extrusionOk="0">
+                <a:moveTo>
+                  <a:pt x="0" y="0"/>
+                </a:moveTo>
+                <a:cubicBezTo>
+                  <a:pt x="257539" y="-55887"/>
+                  <a:pt x="330569" y="23903"/>
+                  <a:pt x="650966" y="0"/>
+                </a:cubicBezTo>
+                <a:cubicBezTo>
+                  <a:pt x="971363" y="-23903"/>
+                  <a:pt x="905133" y="13345"/>
+                  <a:pt x="1022947" y="0"/>
+                </a:cubicBezTo>
+                <a:cubicBezTo>
+                  <a:pt x="1140761" y="-13345"/>
+                  <a:pt x="1353945" y="53176"/>
+                  <a:pt x="1604167" y="0"/>
+                </a:cubicBezTo>
+                <a:cubicBezTo>
+                  <a:pt x="1854389" y="-53176"/>
+                  <a:pt x="1970251" y="21385"/>
+                  <a:pt x="2115641" y="0"/>
+                </a:cubicBezTo>
+                <a:cubicBezTo>
+                  <a:pt x="2261031" y="-21385"/>
+                  <a:pt x="2337830" y="42786"/>
+                  <a:pt x="2487622" y="0"/>
+                </a:cubicBezTo>
+                <a:cubicBezTo>
+                  <a:pt x="2637414" y="-42786"/>
+                  <a:pt x="2894214" y="71530"/>
+                  <a:pt x="3208335" y="0"/>
+                </a:cubicBezTo>
+                <a:cubicBezTo>
+                  <a:pt x="3522456" y="-71530"/>
+                  <a:pt x="3512617" y="59199"/>
+                  <a:pt x="3719809" y="0"/>
+                </a:cubicBezTo>
+                <a:cubicBezTo>
+                  <a:pt x="3927001" y="-59199"/>
+                  <a:pt x="4172144" y="37850"/>
+                  <a:pt x="4370775" y="0"/>
+                </a:cubicBezTo>
+                <a:cubicBezTo>
+                  <a:pt x="4569406" y="-37850"/>
+                  <a:pt x="4669554" y="13025"/>
+                  <a:pt x="4882249" y="0"/>
+                </a:cubicBezTo>
+                <a:cubicBezTo>
+                  <a:pt x="5094944" y="-13025"/>
+                  <a:pt x="5127535" y="17794"/>
+                  <a:pt x="5323976" y="0"/>
+                </a:cubicBezTo>
+                <a:cubicBezTo>
+                  <a:pt x="5520417" y="-17794"/>
+                  <a:pt x="5833317" y="41431"/>
+                  <a:pt x="6044689" y="0"/>
+                </a:cubicBezTo>
+                <a:cubicBezTo>
+                  <a:pt x="6256061" y="-41431"/>
+                  <a:pt x="6736432" y="55254"/>
+                  <a:pt x="6974641" y="0"/>
+                </a:cubicBezTo>
+                <a:cubicBezTo>
+                  <a:pt x="7025675" y="198538"/>
+                  <a:pt x="6955195" y="370667"/>
+                  <a:pt x="6974641" y="497675"/>
+                </a:cubicBezTo>
+                <a:cubicBezTo>
+                  <a:pt x="6994087" y="624683"/>
+                  <a:pt x="6953043" y="843364"/>
+                  <a:pt x="6974641" y="1015663"/>
+                </a:cubicBezTo>
+                <a:cubicBezTo>
+                  <a:pt x="6802696" y="1040650"/>
+                  <a:pt x="6495841" y="1003558"/>
+                  <a:pt x="6253928" y="1015663"/>
+                </a:cubicBezTo>
+                <a:cubicBezTo>
+                  <a:pt x="6012015" y="1027768"/>
+                  <a:pt x="5961248" y="1013622"/>
+                  <a:pt x="5881947" y="1015663"/>
+                </a:cubicBezTo>
+                <a:cubicBezTo>
+                  <a:pt x="5802646" y="1017704"/>
+                  <a:pt x="5565585" y="1002724"/>
+                  <a:pt x="5370474" y="1015663"/>
+                </a:cubicBezTo>
+                <a:cubicBezTo>
+                  <a:pt x="5175363" y="1028602"/>
+                  <a:pt x="5133521" y="996210"/>
+                  <a:pt x="4998493" y="1015663"/>
+                </a:cubicBezTo>
+                <a:cubicBezTo>
+                  <a:pt x="4863465" y="1035116"/>
+                  <a:pt x="4546612" y="941008"/>
+                  <a:pt x="4347526" y="1015663"/>
+                </a:cubicBezTo>
+                <a:cubicBezTo>
+                  <a:pt x="4148440" y="1090318"/>
+                  <a:pt x="3980429" y="995698"/>
+                  <a:pt x="3836053" y="1015663"/>
+                </a:cubicBezTo>
+                <a:cubicBezTo>
+                  <a:pt x="3691677" y="1035628"/>
+                  <a:pt x="3434506" y="971555"/>
+                  <a:pt x="3324579" y="1015663"/>
+                </a:cubicBezTo>
+                <a:cubicBezTo>
+                  <a:pt x="3214652" y="1059771"/>
+                  <a:pt x="3044510" y="978384"/>
+                  <a:pt x="2952598" y="1015663"/>
+                </a:cubicBezTo>
+                <a:cubicBezTo>
+                  <a:pt x="2860686" y="1052942"/>
+                  <a:pt x="2651330" y="990553"/>
+                  <a:pt x="2441124" y="1015663"/>
+                </a:cubicBezTo>
+                <a:cubicBezTo>
+                  <a:pt x="2230918" y="1040773"/>
+                  <a:pt x="2041152" y="952868"/>
+                  <a:pt x="1859904" y="1015663"/>
+                </a:cubicBezTo>
+                <a:cubicBezTo>
+                  <a:pt x="1678656" y="1078458"/>
+                  <a:pt x="1510574" y="970241"/>
+                  <a:pt x="1208938" y="1015663"/>
+                </a:cubicBezTo>
+                <a:cubicBezTo>
+                  <a:pt x="907302" y="1061085"/>
+                  <a:pt x="280139" y="929819"/>
+                  <a:pt x="0" y="1015663"/>
+                </a:cubicBezTo>
+                <a:cubicBezTo>
+                  <a:pt x="-52756" y="815996"/>
+                  <a:pt x="41022" y="633547"/>
+                  <a:pt x="0" y="497675"/>
+                </a:cubicBezTo>
+                <a:cubicBezTo>
+                  <a:pt x="-41022" y="361803"/>
+                  <a:pt x="28782" y="219493"/>
+                  <a:pt x="0" y="0"/>
+                </a:cubicBezTo>
+                <a:close/>
+              </a:path>
+            </a:pathLst>
+          </a:custGeom>
+          <a:noFill/>
+          <a:ln>
+            <a:solidFill>
+              <a:schemeClr val="tx1"/>
+            </a:solidFill>
+            <a:extLst>
+              <a:ext uri="{C807C97D-BFC1-408E-A445-0C87EB9F89A2}">
+                <ask:lineSketchStyleProps xmlns:ask="http://schemas.microsoft.com/office/drawing/2018/sketchyshapes" sd="1194990433">
+                  <a:prstGeom prst="rect">
+                    <a:avLst/>
+                  </a:prstGeom>
+                  <ask:type>
+                    <ask:lineSketchScribble/>
+                  </ask:type>
+                </ask:lineSketchStyleProps>
+              </a:ext>
+            </a:extLst>
+          </a:ln>
+        </p:spPr>
+        <p:txBody>
+          <a:bodyPr wrap="square" rtlCol="0">
+            <a:spAutoFit/>
+          </a:bodyPr>
+          <a:lstStyle/>
+          <a:p>
+            <a:r>
+              <a:rPr lang="en-US" sz="2000" b="1" dirty="0">
+                <a:latin typeface="Ink Free" panose="03080402000500000000" pitchFamily="66" charset="0"/>
+              </a:rPr>
+              <a:t>MUD-Visualizer loads a default device, i.e. a PC, which can communicate to  google.com and amazon.com on the internet, and can also communicate with all the local network devices</a:t>
+            </a:r>
+          </a:p>
+        </p:txBody>
+      </p:sp>
+    </p:spTree>
+    <p:extLst>
+      <p:ext uri="{BB962C8B-B14F-4D97-AF65-F5344CB8AC3E}">
+        <p14:creationId xmlns:p14="http://schemas.microsoft.com/office/powerpoint/2010/main" val="2252250651"/>
+      </p:ext>
+    </p:extLst>
+  </p:cSld>
+  <p:clrMapOvr>
+    <a:masterClrMapping/>
+  </p:clrMapOvr>
+</p:sld>
+</file>
+
+<file path=ppt/slides/slide2.xml><?xml version="1.0" encoding="utf-8"?>
+<p:sld xmlns:a="http://schemas.openxmlformats.org/drawingml/2006/main" xmlns:r="http://schemas.openxmlformats.org/officeDocument/2006/relationships" xmlns:p="http://schemas.openxmlformats.org/presentationml/2006/main">
+  <p:cSld>
+    <p:spTree>
+      <p:nvGrpSpPr>
+        <p:cNvPr id="1" name=""/>
+        <p:cNvGrpSpPr/>
+        <p:nvPr/>
+      </p:nvGrpSpPr>
+      <p:grpSpPr>
+        <a:xfrm>
+          <a:off x="0" y="0"/>
+          <a:ext cx="0" cy="0"/>
+          <a:chOff x="0" y="0"/>
+          <a:chExt cx="0" cy="0"/>
+        </a:xfrm>
+      </p:grpSpPr>
+      <p:pic>
+        <p:nvPicPr>
+          <p:cNvPr id="3" name="Picture 2">
+            <a:extLst>
+              <a:ext uri="{FF2B5EF4-FFF2-40B4-BE49-F238E27FC236}">
+                <a16:creationId xmlns:a16="http://schemas.microsoft.com/office/drawing/2014/main" id="{F8BE1249-2A5C-4937-97FC-642622781AE4}"/>
+              </a:ext>
+            </a:extLst>
+          </p:cNvPr>
+          <p:cNvPicPr>
+            <a:picLocks noChangeAspect="1"/>
+          </p:cNvPicPr>
+          <p:nvPr/>
+        </p:nvPicPr>
+        <p:blipFill>
+          <a:blip r:embed="rId2"/>
+          <a:stretch>
+            <a:fillRect/>
+          </a:stretch>
+        </p:blipFill>
+        <p:spPr>
+          <a:xfrm>
+            <a:off x="875950" y="387099"/>
+            <a:ext cx="10534289" cy="5569083"/>
+          </a:xfrm>
+          <a:prstGeom prst="rect">
+            <a:avLst/>
+          </a:prstGeom>
+        </p:spPr>
+      </p:pic>
+      <p:graphicFrame>
+        <p:nvGraphicFramePr>
+          <p:cNvPr id="9" name="Diagram 8">
+            <a:extLst>
+              <a:ext uri="{FF2B5EF4-FFF2-40B4-BE49-F238E27FC236}">
+                <a16:creationId xmlns:a16="http://schemas.microsoft.com/office/drawing/2014/main" id="{04101357-049A-4344-A88A-E46E1BF397F0}"/>
+              </a:ext>
+            </a:extLst>
+          </p:cNvPr>
+          <p:cNvGraphicFramePr/>
+          <p:nvPr/>
+        </p:nvGraphicFramePr>
+        <p:xfrm>
+          <a:off x="1170656" y="387098"/>
+          <a:ext cx="3320177" cy="5530127"/>
         </p:xfrm>
         <a:graphic>
           <a:graphicData uri="http://schemas.openxmlformats.org/drawingml/2006/diagram">
@@ -16742,7 +19840,7 @@
         </p:nvSpPr>
         <p:spPr>
           <a:xfrm>
-            <a:off x="2376333" y="4772604"/>
+            <a:off x="1749303" y="4801071"/>
             <a:ext cx="6785832" cy="400110"/>
           </a:xfrm>
           <a:custGeom>
@@ -17085,7 +20183,7 @@
         </p:nvSpPr>
         <p:spPr>
           <a:xfrm>
-            <a:off x="3127151" y="3787007"/>
+            <a:off x="2546864" y="4171424"/>
             <a:ext cx="6797054" cy="400110"/>
           </a:xfrm>
           <a:custGeom>
@@ -17438,7 +20536,7 @@
         </p:nvSpPr>
         <p:spPr>
           <a:xfrm>
-            <a:off x="3605013" y="2941759"/>
+            <a:off x="3801983" y="1889361"/>
             <a:ext cx="7377341" cy="400110"/>
           </a:xfrm>
           <a:custGeom>
@@ -17791,7 +20889,7 @@
         </p:nvSpPr>
         <p:spPr>
           <a:xfrm>
-            <a:off x="3948616" y="2122690"/>
+            <a:off x="3801983" y="1316465"/>
             <a:ext cx="4221027" cy="400110"/>
           </a:xfrm>
           <a:custGeom>
@@ -18044,7 +21142,7 @@
         </p:nvSpPr>
         <p:spPr>
           <a:xfrm>
-            <a:off x="4096528" y="1187471"/>
+            <a:off x="3801983" y="698435"/>
             <a:ext cx="2214068" cy="400110"/>
           </a:xfrm>
           <a:custGeom>
@@ -18205,10 +21303,203 @@
       </p:sp>
       <p:sp>
         <p:nvSpPr>
-          <p:cNvPr id="26" name="Shape 25">
+          <p:cNvPr id="16" name="TextBox 15">
             <a:extLst>
               <a:ext uri="{FF2B5EF4-FFF2-40B4-BE49-F238E27FC236}">
-                <a16:creationId xmlns:a16="http://schemas.microsoft.com/office/drawing/2014/main" id="{FB3E72F7-C088-41C1-9FD0-1DAB7E0AE161}"/>
+                <a16:creationId xmlns:a16="http://schemas.microsoft.com/office/drawing/2014/main" id="{3C7BD077-4916-4FD1-84DB-8073E623735A}"/>
+              </a:ext>
+            </a:extLst>
+          </p:cNvPr>
+          <p:cNvSpPr txBox="1"/>
+          <p:nvPr/>
+        </p:nvSpPr>
+        <p:spPr>
+          <a:xfrm>
+            <a:off x="1136907" y="5365948"/>
+            <a:ext cx="2443298" cy="400110"/>
+          </a:xfrm>
+          <a:custGeom>
+            <a:avLst/>
+            <a:gdLst>
+              <a:gd name="connsiteX0" fmla="*/ 0 w 2443298"/>
+              <a:gd name="connsiteY0" fmla="*/ 0 h 400110"/>
+              <a:gd name="connsiteX1" fmla="*/ 513093 w 2443298"/>
+              <a:gd name="connsiteY1" fmla="*/ 0 h 400110"/>
+              <a:gd name="connsiteX2" fmla="*/ 1050618 w 2443298"/>
+              <a:gd name="connsiteY2" fmla="*/ 0 h 400110"/>
+              <a:gd name="connsiteX3" fmla="*/ 1465979 w 2443298"/>
+              <a:gd name="connsiteY3" fmla="*/ 0 h 400110"/>
+              <a:gd name="connsiteX4" fmla="*/ 1930205 w 2443298"/>
+              <a:gd name="connsiteY4" fmla="*/ 0 h 400110"/>
+              <a:gd name="connsiteX5" fmla="*/ 2443298 w 2443298"/>
+              <a:gd name="connsiteY5" fmla="*/ 0 h 400110"/>
+              <a:gd name="connsiteX6" fmla="*/ 2443298 w 2443298"/>
+              <a:gd name="connsiteY6" fmla="*/ 400110 h 400110"/>
+              <a:gd name="connsiteX7" fmla="*/ 2027937 w 2443298"/>
+              <a:gd name="connsiteY7" fmla="*/ 400110 h 400110"/>
+              <a:gd name="connsiteX8" fmla="*/ 1539278 w 2443298"/>
+              <a:gd name="connsiteY8" fmla="*/ 400110 h 400110"/>
+              <a:gd name="connsiteX9" fmla="*/ 1050618 w 2443298"/>
+              <a:gd name="connsiteY9" fmla="*/ 400110 h 400110"/>
+              <a:gd name="connsiteX10" fmla="*/ 537526 w 2443298"/>
+              <a:gd name="connsiteY10" fmla="*/ 400110 h 400110"/>
+              <a:gd name="connsiteX11" fmla="*/ 0 w 2443298"/>
+              <a:gd name="connsiteY11" fmla="*/ 400110 h 400110"/>
+              <a:gd name="connsiteX12" fmla="*/ 0 w 2443298"/>
+              <a:gd name="connsiteY12" fmla="*/ 0 h 400110"/>
+            </a:gdLst>
+            <a:ahLst/>
+            <a:cxnLst>
+              <a:cxn ang="0">
+                <a:pos x="connsiteX0" y="connsiteY0"/>
+              </a:cxn>
+              <a:cxn ang="0">
+                <a:pos x="connsiteX1" y="connsiteY1"/>
+              </a:cxn>
+              <a:cxn ang="0">
+                <a:pos x="connsiteX2" y="connsiteY2"/>
+              </a:cxn>
+              <a:cxn ang="0">
+                <a:pos x="connsiteX3" y="connsiteY3"/>
+              </a:cxn>
+              <a:cxn ang="0">
+                <a:pos x="connsiteX4" y="connsiteY4"/>
+              </a:cxn>
+              <a:cxn ang="0">
+                <a:pos x="connsiteX5" y="connsiteY5"/>
+              </a:cxn>
+              <a:cxn ang="0">
+                <a:pos x="connsiteX6" y="connsiteY6"/>
+              </a:cxn>
+              <a:cxn ang="0">
+                <a:pos x="connsiteX7" y="connsiteY7"/>
+              </a:cxn>
+              <a:cxn ang="0">
+                <a:pos x="connsiteX8" y="connsiteY8"/>
+              </a:cxn>
+              <a:cxn ang="0">
+                <a:pos x="connsiteX9" y="connsiteY9"/>
+              </a:cxn>
+              <a:cxn ang="0">
+                <a:pos x="connsiteX10" y="connsiteY10"/>
+              </a:cxn>
+              <a:cxn ang="0">
+                <a:pos x="connsiteX11" y="connsiteY11"/>
+              </a:cxn>
+              <a:cxn ang="0">
+                <a:pos x="connsiteX12" y="connsiteY12"/>
+              </a:cxn>
+            </a:cxnLst>
+            <a:rect l="l" t="t" r="r" b="b"/>
+            <a:pathLst>
+              <a:path w="2443298" h="400110" extrusionOk="0">
+                <a:moveTo>
+                  <a:pt x="0" y="0"/>
+                </a:moveTo>
+                <a:cubicBezTo>
+                  <a:pt x="189385" y="-17811"/>
+                  <a:pt x="385151" y="13612"/>
+                  <a:pt x="513093" y="0"/>
+                </a:cubicBezTo>
+                <a:cubicBezTo>
+                  <a:pt x="641035" y="-13612"/>
+                  <a:pt x="920905" y="31585"/>
+                  <a:pt x="1050618" y="0"/>
+                </a:cubicBezTo>
+                <a:cubicBezTo>
+                  <a:pt x="1180332" y="-31585"/>
+                  <a:pt x="1372809" y="5928"/>
+                  <a:pt x="1465979" y="0"/>
+                </a:cubicBezTo>
+                <a:cubicBezTo>
+                  <a:pt x="1559149" y="-5928"/>
+                  <a:pt x="1717285" y="25446"/>
+                  <a:pt x="1930205" y="0"/>
+                </a:cubicBezTo>
+                <a:cubicBezTo>
+                  <a:pt x="2143125" y="-25446"/>
+                  <a:pt x="2303650" y="48774"/>
+                  <a:pt x="2443298" y="0"/>
+                </a:cubicBezTo>
+                <a:cubicBezTo>
+                  <a:pt x="2481764" y="183185"/>
+                  <a:pt x="2428602" y="270630"/>
+                  <a:pt x="2443298" y="400110"/>
+                </a:cubicBezTo>
+                <a:cubicBezTo>
+                  <a:pt x="2261448" y="433685"/>
+                  <a:pt x="2111596" y="355614"/>
+                  <a:pt x="2027937" y="400110"/>
+                </a:cubicBezTo>
+                <a:cubicBezTo>
+                  <a:pt x="1944278" y="444606"/>
+                  <a:pt x="1775187" y="352157"/>
+                  <a:pt x="1539278" y="400110"/>
+                </a:cubicBezTo>
+                <a:cubicBezTo>
+                  <a:pt x="1303369" y="448063"/>
+                  <a:pt x="1180584" y="393546"/>
+                  <a:pt x="1050618" y="400110"/>
+                </a:cubicBezTo>
+                <a:cubicBezTo>
+                  <a:pt x="920652" y="406674"/>
+                  <a:pt x="783441" y="345752"/>
+                  <a:pt x="537526" y="400110"/>
+                </a:cubicBezTo>
+                <a:cubicBezTo>
+                  <a:pt x="291611" y="454468"/>
+                  <a:pt x="173188" y="341993"/>
+                  <a:pt x="0" y="400110"/>
+                </a:cubicBezTo>
+                <a:cubicBezTo>
+                  <a:pt x="-40363" y="286693"/>
+                  <a:pt x="2233" y="100523"/>
+                  <a:pt x="0" y="0"/>
+                </a:cubicBezTo>
+                <a:close/>
+              </a:path>
+            </a:pathLst>
+          </a:custGeom>
+          <a:noFill/>
+          <a:ln>
+            <a:solidFill>
+              <a:schemeClr val="tx1"/>
+            </a:solidFill>
+            <a:extLst>
+              <a:ext uri="{C807C97D-BFC1-408E-A445-0C87EB9F89A2}">
+                <ask:lineSketchStyleProps xmlns:ask="http://schemas.microsoft.com/office/drawing/2018/sketchyshapes" sd="2391285065">
+                  <a:prstGeom prst="rect">
+                    <a:avLst/>
+                  </a:prstGeom>
+                  <ask:type>
+                    <ask:lineSketchScribble/>
+                  </ask:type>
+                </ask:lineSketchStyleProps>
+              </a:ext>
+            </a:extLst>
+          </a:ln>
+        </p:spPr>
+        <p:txBody>
+          <a:bodyPr wrap="none" rtlCol="0">
+            <a:spAutoFit/>
+          </a:bodyPr>
+          <a:lstStyle/>
+          <a:p>
+            <a:r>
+              <a:rPr lang="en-US" sz="2000" b="1" dirty="0">
+                <a:latin typeface="Ink Free" panose="03080402000500000000" pitchFamily="66" charset="0"/>
+              </a:rPr>
+              <a:t>Opens the help page</a:t>
+            </a:r>
+          </a:p>
+        </p:txBody>
+      </p:sp>
+      <p:sp>
+        <p:nvSpPr>
+          <p:cNvPr id="18" name="Shape 17">
+            <a:extLst>
+              <a:ext uri="{FF2B5EF4-FFF2-40B4-BE49-F238E27FC236}">
+                <a16:creationId xmlns:a16="http://schemas.microsoft.com/office/drawing/2014/main" id="{92EF68EA-D9AA-4D55-BB72-0D3524004170}"/>
               </a:ext>
             </a:extLst>
           </p:cNvPr>
@@ -18216,9 +21507,9 @@
           <p:nvPr/>
         </p:nvSpPr>
         <p:spPr>
-          <a:xfrm rot="3717158">
-            <a:off x="1107957" y="2275342"/>
-            <a:ext cx="2558867" cy="1037596"/>
+          <a:xfrm rot="6431770">
+            <a:off x="309492" y="3834419"/>
+            <a:ext cx="2075780" cy="773479"/>
           </a:xfrm>
           <a:prstGeom prst="swooshArrow">
             <a:avLst>
@@ -18260,10 +21551,10 @@
       </p:sp>
       <p:sp>
         <p:nvSpPr>
-          <p:cNvPr id="27" name="Shape 26">
+          <p:cNvPr id="19" name="Shape 18">
             <a:extLst>
               <a:ext uri="{FF2B5EF4-FFF2-40B4-BE49-F238E27FC236}">
-                <a16:creationId xmlns:a16="http://schemas.microsoft.com/office/drawing/2014/main" id="{F76E2ED7-C98F-4B99-B0CD-FE8559C10DC4}"/>
+                <a16:creationId xmlns:a16="http://schemas.microsoft.com/office/drawing/2014/main" id="{01443BD9-B2C5-4B82-ACFE-41EEEE414AB3}"/>
               </a:ext>
             </a:extLst>
           </p:cNvPr>
@@ -18271,9 +21562,9 @@
           <p:nvPr/>
         </p:nvSpPr>
         <p:spPr>
-          <a:xfrm rot="2799331">
-            <a:off x="1342208" y="1620393"/>
-            <a:ext cx="2558867" cy="1037596"/>
+          <a:xfrm rot="5217802">
+            <a:off x="774012" y="3280448"/>
+            <a:ext cx="2158438" cy="784454"/>
           </a:xfrm>
           <a:prstGeom prst="swooshArrow">
             <a:avLst>
@@ -18315,10 +21606,10 @@
       </p:sp>
       <p:sp>
         <p:nvSpPr>
-          <p:cNvPr id="28" name="Shape 27">
+          <p:cNvPr id="21" name="Shape 20">
             <a:extLst>
               <a:ext uri="{FF2B5EF4-FFF2-40B4-BE49-F238E27FC236}">
-                <a16:creationId xmlns:a16="http://schemas.microsoft.com/office/drawing/2014/main" id="{88A471B4-0DE7-4BFB-BFF4-9C091140FD64}"/>
+                <a16:creationId xmlns:a16="http://schemas.microsoft.com/office/drawing/2014/main" id="{69C01600-5A42-4331-94C5-FD8D0FD49A4A}"/>
               </a:ext>
             </a:extLst>
           </p:cNvPr>
@@ -18326,9 +21617,9 @@
           <p:nvPr/>
         </p:nvSpPr>
         <p:spPr>
-          <a:xfrm rot="2322528">
-            <a:off x="1386082" y="1052857"/>
-            <a:ext cx="2558867" cy="1037596"/>
+          <a:xfrm rot="4431863">
+            <a:off x="1000044" y="2717359"/>
+            <a:ext cx="2158438" cy="784454"/>
           </a:xfrm>
           <a:prstGeom prst="swooshArrow">
             <a:avLst>
@@ -18370,10 +21661,10 @@
       </p:sp>
       <p:sp>
         <p:nvSpPr>
-          <p:cNvPr id="29" name="Shape 28">
+          <p:cNvPr id="23" name="Shape 22">
             <a:extLst>
               <a:ext uri="{FF2B5EF4-FFF2-40B4-BE49-F238E27FC236}">
-                <a16:creationId xmlns:a16="http://schemas.microsoft.com/office/drawing/2014/main" id="{9EC9AEF6-F742-4CC2-8728-B5DD983A3CFC}"/>
+                <a16:creationId xmlns:a16="http://schemas.microsoft.com/office/drawing/2014/main" id="{32B3679B-6BD5-4336-934E-D16B6DEF5D6F}"/>
               </a:ext>
             </a:extLst>
           </p:cNvPr>
@@ -18381,9 +21672,119 @@
           <p:nvPr/>
         </p:nvSpPr>
         <p:spPr>
-          <a:xfrm rot="1838890">
-            <a:off x="1451915" y="452458"/>
-            <a:ext cx="2558867" cy="1037596"/>
+          <a:xfrm rot="1269614">
+            <a:off x="1467645" y="270519"/>
+            <a:ext cx="2158438" cy="784454"/>
+          </a:xfrm>
+          <a:prstGeom prst="swooshArrow">
+            <a:avLst>
+              <a:gd name="adj1" fmla="val 16310"/>
+              <a:gd name="adj2" fmla="val 31370"/>
+            </a:avLst>
+          </a:prstGeom>
+          <a:solidFill>
+            <a:schemeClr val="tx1">
+              <a:lumMod val="65000"/>
+              <a:lumOff val="35000"/>
+            </a:schemeClr>
+          </a:solidFill>
+        </p:spPr>
+        <p:style>
+          <a:lnRef idx="0">
+            <a:schemeClr val="lt1">
+              <a:hueOff val="0"/>
+              <a:satOff val="0"/>
+              <a:lumOff val="0"/>
+              <a:alphaOff val="0"/>
+            </a:schemeClr>
+          </a:lnRef>
+          <a:fillRef idx="3">
+            <a:scrgbClr r="0" g="0" b="0"/>
+          </a:fillRef>
+          <a:effectRef idx="3">
+            <a:schemeClr val="accent1">
+              <a:hueOff val="0"/>
+              <a:satOff val="0"/>
+              <a:lumOff val="0"/>
+              <a:alphaOff val="0"/>
+            </a:schemeClr>
+          </a:effectRef>
+          <a:fontRef idx="minor">
+            <a:schemeClr val="lt1"/>
+          </a:fontRef>
+        </p:style>
+      </p:sp>
+      <p:sp>
+        <p:nvSpPr>
+          <p:cNvPr id="25" name="Shape 24">
+            <a:extLst>
+              <a:ext uri="{FF2B5EF4-FFF2-40B4-BE49-F238E27FC236}">
+                <a16:creationId xmlns:a16="http://schemas.microsoft.com/office/drawing/2014/main" id="{48F95D24-EBFB-48AD-8BF4-85FFBF3ECB13}"/>
+              </a:ext>
+            </a:extLst>
+          </p:cNvPr>
+          <p:cNvSpPr/>
+          <p:nvPr/>
+        </p:nvSpPr>
+        <p:spPr>
+          <a:xfrm rot="1358164">
+            <a:off x="1468641" y="858812"/>
+            <a:ext cx="2158438" cy="784454"/>
+          </a:xfrm>
+          <a:prstGeom prst="swooshArrow">
+            <a:avLst>
+              <a:gd name="adj1" fmla="val 16310"/>
+              <a:gd name="adj2" fmla="val 31370"/>
+            </a:avLst>
+          </a:prstGeom>
+          <a:solidFill>
+            <a:schemeClr val="tx1">
+              <a:lumMod val="65000"/>
+              <a:lumOff val="35000"/>
+            </a:schemeClr>
+          </a:solidFill>
+        </p:spPr>
+        <p:style>
+          <a:lnRef idx="0">
+            <a:schemeClr val="lt1">
+              <a:hueOff val="0"/>
+              <a:satOff val="0"/>
+              <a:lumOff val="0"/>
+              <a:alphaOff val="0"/>
+            </a:schemeClr>
+          </a:lnRef>
+          <a:fillRef idx="3">
+            <a:scrgbClr r="0" g="0" b="0"/>
+          </a:fillRef>
+          <a:effectRef idx="3">
+            <a:schemeClr val="accent1">
+              <a:hueOff val="0"/>
+              <a:satOff val="0"/>
+              <a:lumOff val="0"/>
+              <a:alphaOff val="0"/>
+            </a:schemeClr>
+          </a:effectRef>
+          <a:fontRef idx="minor">
+            <a:schemeClr val="lt1"/>
+          </a:fontRef>
+        </p:style>
+      </p:sp>
+      <p:sp>
+        <p:nvSpPr>
+          <p:cNvPr id="30" name="Shape 29">
+            <a:extLst>
+              <a:ext uri="{FF2B5EF4-FFF2-40B4-BE49-F238E27FC236}">
+                <a16:creationId xmlns:a16="http://schemas.microsoft.com/office/drawing/2014/main" id="{D6EF2049-9AEB-415C-A358-C651023F7EEA}"/>
+              </a:ext>
+            </a:extLst>
+          </p:cNvPr>
+          <p:cNvSpPr/>
+          <p:nvPr/>
+        </p:nvSpPr>
+        <p:spPr>
+          <a:xfrm rot="1358164">
+            <a:off x="1468639" y="1380768"/>
+            <a:ext cx="2158438" cy="784454"/>
           </a:xfrm>
           <a:prstGeom prst="swooshArrow">
             <a:avLst>
@@ -18426,7 +21827,7 @@
     </p:spTree>
     <p:extLst>
       <p:ext uri="{BB962C8B-B14F-4D97-AF65-F5344CB8AC3E}">
-        <p14:creationId xmlns:p14="http://schemas.microsoft.com/office/powerpoint/2010/main" val="2252250651"/>
+        <p14:creationId xmlns:p14="http://schemas.microsoft.com/office/powerpoint/2010/main" val="665725044"/>
       </p:ext>
     </p:extLst>
   </p:cSld>
@@ -18436,7 +21837,7 @@
 </p:sld>
 </file>
 
-<file path=ppt/slides/slide2.xml><?xml version="1.0" encoding="utf-8"?>
+<file path=ppt/slides/slide3.xml><?xml version="1.0" encoding="utf-8"?>
 <p:sld xmlns:a="http://schemas.openxmlformats.org/drawingml/2006/main" xmlns:r="http://schemas.openxmlformats.org/officeDocument/2006/relationships" xmlns:p="http://schemas.openxmlformats.org/presentationml/2006/main">
   <p:cSld>
     <p:spTree>
@@ -19664,7 +23065,7 @@
 </p:sld>
 </file>
 
-<file path=ppt/slides/slide3.xml><?xml version="1.0" encoding="utf-8"?>
+<file path=ppt/slides/slide4.xml><?xml version="1.0" encoding="utf-8"?>
 <p:sld xmlns:a="http://schemas.openxmlformats.org/drawingml/2006/main" xmlns:r="http://schemas.openxmlformats.org/officeDocument/2006/relationships" xmlns:p="http://schemas.openxmlformats.org/presentationml/2006/main">
   <p:cSld>
     <p:spTree>
@@ -20376,7 +23777,7 @@
 </p:sld>
 </file>
 
-<file path=ppt/slides/slide4.xml><?xml version="1.0" encoding="utf-8"?>
+<file path=ppt/slides/slide5.xml><?xml version="1.0" encoding="utf-8"?>
 <p:sld xmlns:a="http://schemas.openxmlformats.org/drawingml/2006/main" xmlns:r="http://schemas.openxmlformats.org/officeDocument/2006/relationships" xmlns:p="http://schemas.openxmlformats.org/presentationml/2006/main">
   <p:cSld>
     <p:spTree>
@@ -20725,7 +24126,7 @@
 </p:sld>
 </file>
 
-<file path=ppt/slides/slide5.xml><?xml version="1.0" encoding="utf-8"?>
+<file path=ppt/slides/slide6.xml><?xml version="1.0" encoding="utf-8"?>
 <p:sld xmlns:a="http://schemas.openxmlformats.org/drawingml/2006/main" xmlns:r="http://schemas.openxmlformats.org/officeDocument/2006/relationships" xmlns:p="http://schemas.openxmlformats.org/presentationml/2006/main">
   <p:cSld>
     <p:spTree>

</xml_diff>